<commit_message>
2nd .pptx in both themes (our and TUM)
</commit_message>
<xml_diff>
--- a/Presentations/presentation_2/SW-Lab_presentation2.pptx
+++ b/Presentations/presentation_2/SW-Lab_presentation2.pptx
@@ -207,7 +207,7 @@
           <a:p>
             <a:fld id="{006BF810-5204-B443-AACD-94BF0894D26F}" type="datetimeFigureOut">
               <a:rPr lang="en-US" smtClean="0"/>
-              <a:t>6/16/16</a:t>
+              <a:t>6/23/16</a:t>
             </a:fld>
             <a:endParaRPr lang="en-US"/>
           </a:p>
@@ -4338,19 +4338,19 @@
           <a:p>
             <a:r>
               <a:rPr lang="en-US" dirty="0" smtClean="0"/>
-              <a:t>Software Lab: 2</a:t>
-            </a:r>
-            <a:r>
-              <a:rPr lang="en-US" baseline="30000" dirty="0" smtClean="0"/>
+              <a:t>Software Lab: </a:t>
+            </a:r>
+            <a:r>
+              <a:rPr lang="en-US" smtClean="0"/>
+              <a:t>2</a:t>
+            </a:r>
+            <a:r>
+              <a:rPr lang="en-US" baseline="30000" smtClean="0"/>
               <a:t>nd</a:t>
             </a:r>
             <a:r>
-              <a:rPr lang="en-US" dirty="0" smtClean="0"/>
-              <a:t> </a:t>
-            </a:r>
-            <a:r>
-              <a:rPr lang="en-US" dirty="0" err="1" smtClean="0"/>
-              <a:t>assesment</a:t>
+              <a:rPr lang="en-US" smtClean="0"/>
+              <a:t> assessment</a:t>
             </a:r>
             <a:endParaRPr lang="en-US" dirty="0"/>
           </a:p>
@@ -4635,70 +4635,6 @@
           <a:chExt cx="0" cy="0"/>
         </a:xfrm>
       </p:grpSpPr>
-      <p:pic>
-        <p:nvPicPr>
-          <p:cNvPr id="9" name="Lamina Complessa.mp4">
-            <a:hlinkClick r:id="" action="ppaction://media"/>
-          </p:cNvPr>
-          <p:cNvPicPr>
-            <a:picLocks noChangeAspect="1"/>
-          </p:cNvPicPr>
-          <p:nvPr>
-            <a:videoFile r:link="rId2"/>
-            <p:extLst>
-              <p:ext uri="{DAA4B4D4-6D71-4841-9C94-3DE7FCFB9230}">
-                <p14:media xmlns:p14="http://schemas.microsoft.com/office/powerpoint/2010/main" r:embed="rId1"/>
-              </p:ext>
-            </p:extLst>
-          </p:nvPr>
-        </p:nvPicPr>
-        <p:blipFill>
-          <a:blip r:embed="rId7"/>
-          <a:stretch>
-            <a:fillRect/>
-          </a:stretch>
-        </p:blipFill>
-        <p:spPr>
-          <a:xfrm>
-            <a:off x="628649" y="1882378"/>
-            <a:ext cx="4629151" cy="3086101"/>
-          </a:xfrm>
-          <a:prstGeom prst="rect">
-            <a:avLst/>
-          </a:prstGeom>
-        </p:spPr>
-      </p:pic>
-      <p:pic>
-        <p:nvPicPr>
-          <p:cNvPr id="7" name="Lamina Semplice.mp4">
-            <a:hlinkClick r:id="" action="ppaction://media"/>
-          </p:cNvPr>
-          <p:cNvPicPr>
-            <a:picLocks noGrp="1" noChangeAspect="1"/>
-          </p:cNvPicPr>
-          <p:nvPr>
-            <p:ph idx="1"/>
-            <a:videoFile r:link="rId4"/>
-            <p:extLst>
-              <p:ext uri="{DAA4B4D4-6D71-4841-9C94-3DE7FCFB9230}">
-                <p14:media xmlns:p14="http://schemas.microsoft.com/office/powerpoint/2010/main" r:embed="rId3"/>
-              </p:ext>
-            </p:extLst>
-          </p:nvPr>
-        </p:nvPicPr>
-        <p:blipFill>
-          <a:blip r:embed="rId8"/>
-          <a:stretch>
-            <a:fillRect/>
-          </a:stretch>
-        </p:blipFill>
-        <p:spPr>
-          <a:xfrm>
-            <a:off x="628650" y="1882379"/>
-            <a:ext cx="4629150" cy="3086100"/>
-          </a:xfrm>
-        </p:spPr>
-      </p:pic>
       <p:sp>
         <p:nvSpPr>
           <p:cNvPr id="4" name="Title 3"/>
@@ -4825,6 +4761,171 @@
           </a:p>
         </p:txBody>
       </p:sp>
+      <p:pic>
+        <p:nvPicPr>
+          <p:cNvPr id="2" name="task1.1.mp4">
+            <a:hlinkClick r:id="" action="ppaction://media"/>
+          </p:cNvPr>
+          <p:cNvPicPr>
+            <a:picLocks noChangeAspect="1"/>
+          </p:cNvPicPr>
+          <p:nvPr>
+            <a:videoFile r:link="rId2"/>
+            <p:extLst>
+              <p:ext uri="{DAA4B4D4-6D71-4841-9C94-3DE7FCFB9230}">
+                <p14:media xmlns:p14="http://schemas.microsoft.com/office/powerpoint/2010/main" r:embed="rId1"/>
+              </p:ext>
+            </p:extLst>
+          </p:nvPr>
+        </p:nvPicPr>
+        <p:blipFill>
+          <a:blip r:embed="rId13"/>
+          <a:stretch>
+            <a:fillRect/>
+          </a:stretch>
+        </p:blipFill>
+        <p:spPr>
+          <a:xfrm>
+            <a:off x="628647" y="1876496"/>
+            <a:ext cx="2501197" cy="1406923"/>
+          </a:xfrm>
+          <a:prstGeom prst="rect">
+            <a:avLst/>
+          </a:prstGeom>
+        </p:spPr>
+      </p:pic>
+      <p:pic>
+        <p:nvPicPr>
+          <p:cNvPr id="3" name="task1.2.mp4">
+            <a:hlinkClick r:id="" action="ppaction://media"/>
+          </p:cNvPr>
+          <p:cNvPicPr>
+            <a:picLocks noChangeAspect="1"/>
+          </p:cNvPicPr>
+          <p:nvPr>
+            <a:videoFile r:link="rId4"/>
+            <p:extLst>
+              <p:ext uri="{DAA4B4D4-6D71-4841-9C94-3DE7FCFB9230}">
+                <p14:media xmlns:p14="http://schemas.microsoft.com/office/powerpoint/2010/main" r:embed="rId3"/>
+              </p:ext>
+            </p:extLst>
+          </p:nvPr>
+        </p:nvPicPr>
+        <p:blipFill>
+          <a:blip r:embed="rId13"/>
+          <a:stretch>
+            <a:fillRect/>
+          </a:stretch>
+        </p:blipFill>
+        <p:spPr>
+          <a:xfrm>
+            <a:off x="3138665" y="1876496"/>
+            <a:ext cx="2495708" cy="1403836"/>
+          </a:xfrm>
+          <a:prstGeom prst="rect">
+            <a:avLst/>
+          </a:prstGeom>
+        </p:spPr>
+      </p:pic>
+      <p:pic>
+        <p:nvPicPr>
+          <p:cNvPr id="5" name="task1.3.mp4">
+            <a:hlinkClick r:id="" action="ppaction://media"/>
+          </p:cNvPr>
+          <p:cNvPicPr>
+            <a:picLocks noChangeAspect="1"/>
+          </p:cNvPicPr>
+          <p:nvPr>
+            <a:videoFile r:link="rId6"/>
+            <p:extLst>
+              <p:ext uri="{DAA4B4D4-6D71-4841-9C94-3DE7FCFB9230}">
+                <p14:media xmlns:p14="http://schemas.microsoft.com/office/powerpoint/2010/main" r:embed="rId5"/>
+              </p:ext>
+            </p:extLst>
+          </p:nvPr>
+        </p:nvPicPr>
+        <p:blipFill>
+          <a:blip r:embed="rId13"/>
+          <a:stretch>
+            <a:fillRect/>
+          </a:stretch>
+        </p:blipFill>
+        <p:spPr>
+          <a:xfrm>
+            <a:off x="624238" y="3283678"/>
+            <a:ext cx="2510016" cy="1411884"/>
+          </a:xfrm>
+          <a:prstGeom prst="rect">
+            <a:avLst/>
+          </a:prstGeom>
+        </p:spPr>
+      </p:pic>
+      <p:pic>
+        <p:nvPicPr>
+          <p:cNvPr id="8" name="task1.4.mp4">
+            <a:hlinkClick r:id="" action="ppaction://media"/>
+          </p:cNvPr>
+          <p:cNvPicPr>
+            <a:picLocks noChangeAspect="1"/>
+          </p:cNvPicPr>
+          <p:nvPr>
+            <a:videoFile r:link="rId8"/>
+            <p:extLst>
+              <p:ext uri="{DAA4B4D4-6D71-4841-9C94-3DE7FCFB9230}">
+                <p14:media xmlns:p14="http://schemas.microsoft.com/office/powerpoint/2010/main" r:embed="rId7"/>
+              </p:ext>
+            </p:extLst>
+          </p:nvPr>
+        </p:nvPicPr>
+        <p:blipFill>
+          <a:blip r:embed="rId13"/>
+          <a:stretch>
+            <a:fillRect/>
+          </a:stretch>
+        </p:blipFill>
+        <p:spPr>
+          <a:xfrm>
+            <a:off x="3138665" y="3280332"/>
+            <a:ext cx="2521913" cy="1418576"/>
+          </a:xfrm>
+          <a:prstGeom prst="rect">
+            <a:avLst/>
+          </a:prstGeom>
+        </p:spPr>
+      </p:pic>
+      <p:pic>
+        <p:nvPicPr>
+          <p:cNvPr id="13" name="Presentation4_21t0fn.mp4">
+            <a:hlinkClick r:id="" action="ppaction://media"/>
+          </p:cNvPr>
+          <p:cNvPicPr>
+            <a:picLocks noChangeAspect="1"/>
+          </p:cNvPicPr>
+          <p:nvPr>
+            <a:videoFile r:link="rId10"/>
+            <p:extLst>
+              <p:ext uri="{DAA4B4D4-6D71-4841-9C94-3DE7FCFB9230}">
+                <p14:media xmlns:p14="http://schemas.microsoft.com/office/powerpoint/2010/main" r:embed="rId9"/>
+              </p:ext>
+            </p:extLst>
+          </p:nvPr>
+        </p:nvPicPr>
+        <p:blipFill>
+          <a:blip r:embed="rId14"/>
+          <a:stretch>
+            <a:fillRect/>
+          </a:stretch>
+        </p:blipFill>
+        <p:spPr>
+          <a:xfrm>
+            <a:off x="429538" y="1863443"/>
+            <a:ext cx="5027372" cy="2827896"/>
+          </a:xfrm>
+          <a:prstGeom prst="rect">
+            <a:avLst/>
+          </a:prstGeom>
+        </p:spPr>
+      </p:pic>
     </p:spTree>
     <p:extLst>
       <p:ext uri="{BB962C8B-B14F-4D97-AF65-F5344CB8AC3E}">
@@ -4942,9 +5043,60 @@
                                   <p:childTnLst>
                                     <p:cmd type="call" cmd="playFrom(0.0)">
                                       <p:cBhvr>
-                                        <p:cTn id="11" dur="6666" fill="hold"/>
+                                        <p:cTn id="11" dur="5875" fill="hold"/>
                                         <p:tgtEl>
-                                          <p:spTgt spid="7"/>
+                                          <p:spTgt spid="2"/>
+                                        </p:tgtEl>
+                                      </p:cBhvr>
+                                    </p:cmd>
+                                  </p:childTnLst>
+                                </p:cTn>
+                              </p:par>
+                              <p:par>
+                                <p:cTn id="12" presetID="1" presetClass="mediacall" presetSubtype="0" fill="hold" nodeType="withEffect">
+                                  <p:stCondLst>
+                                    <p:cond delay="0"/>
+                                  </p:stCondLst>
+                                  <p:childTnLst>
+                                    <p:cmd type="call" cmd="playFrom(0.0)">
+                                      <p:cBhvr>
+                                        <p:cTn id="13" dur="5875" fill="hold"/>
+                                        <p:tgtEl>
+                                          <p:spTgt spid="3"/>
+                                        </p:tgtEl>
+                                      </p:cBhvr>
+                                    </p:cmd>
+                                  </p:childTnLst>
+                                </p:cTn>
+                              </p:par>
+                              <p:par>
+                                <p:cTn id="14" presetID="1" presetClass="mediacall" presetSubtype="0" fill="hold" nodeType="withEffect">
+                                  <p:stCondLst>
+                                    <p:cond delay="0"/>
+                                  </p:stCondLst>
+                                  <p:childTnLst>
+                                    <p:cmd type="call" cmd="playFrom(0.0)">
+                                      <p:cBhvr>
+                                        <p:cTn id="15" dur="5875" fill="hold"/>
+                                        <p:tgtEl>
+                                          <p:spTgt spid="5"/>
+                                        </p:tgtEl>
+                                      </p:cBhvr>
+                                    </p:cmd>
+                                  </p:childTnLst>
+                                </p:cTn>
+                              </p:par>
+                              <p:par>
+                                <p:cTn id="16" presetID="1" presetClass="mediacall" presetSubtype="0" fill="hold" nodeType="withEffect">
+                                  <p:stCondLst>
+                                    <p:cond delay="0"/>
+                                  </p:stCondLst>
+                                  <p:childTnLst>
+                                    <p:cmd type="call" cmd="playFrom(0.0)">
+                                      <p:cBhvr>
+                                        <p:cTn id="17" dur="5875" fill="hold"/>
+                                        <p:tgtEl>
+                                          <p:spTgt spid="8"/>
                                         </p:tgtEl>
                                       </p:cBhvr>
                                     </p:cmd>
@@ -4958,26 +5110,26 @@
                     </p:cTn>
                   </p:par>
                   <p:par>
-                    <p:cTn id="12" fill="hold">
+                    <p:cTn id="18" fill="hold">
                       <p:stCondLst>
                         <p:cond delay="indefinite"/>
                       </p:stCondLst>
                       <p:childTnLst>
                         <p:par>
-                          <p:cTn id="13" fill="hold">
+                          <p:cTn id="19" fill="hold">
                             <p:stCondLst>
                               <p:cond delay="0"/>
                             </p:stCondLst>
                             <p:childTnLst>
                               <p:par>
-                                <p:cTn id="14" presetID="12" presetClass="entr" presetSubtype="2" fill="hold" grpId="0" nodeType="clickEffect">
+                                <p:cTn id="20" presetID="12" presetClass="entr" presetSubtype="2" fill="hold" grpId="0" nodeType="clickEffect">
                                   <p:stCondLst>
                                     <p:cond delay="0"/>
                                   </p:stCondLst>
                                   <p:childTnLst>
                                     <p:set>
                                       <p:cBhvr>
-                                        <p:cTn id="15" dur="1" fill="hold">
+                                        <p:cTn id="21" dur="1" fill="hold">
                                           <p:stCondLst>
                                             <p:cond delay="0"/>
                                           </p:stCondLst>
@@ -4999,7 +5151,7 @@
                                     </p:set>
                                     <p:anim calcmode="lin" valueType="num">
                                       <p:cBhvr additive="base">
-                                        <p:cTn id="16" dur="500"/>
+                                        <p:cTn id="22" dur="500"/>
                                         <p:tgtEl>
                                           <p:spTgt spid="6">
                                             <p:txEl>
@@ -5026,7 +5178,7 @@
                                     </p:anim>
                                     <p:animEffect transition="in" filter="wipe(left)">
                                       <p:cBhvr>
-                                        <p:cTn id="17" dur="500"/>
+                                        <p:cTn id="23" dur="500"/>
                                         <p:tgtEl>
                                           <p:spTgt spid="6">
                                             <p:txEl>
@@ -5040,14 +5192,14 @@
                                 </p:cTn>
                               </p:par>
                               <p:par>
-                                <p:cTn id="18" presetID="9" presetClass="emph" presetSubtype="0" grpId="1" nodeType="withEffect">
+                                <p:cTn id="24" presetID="9" presetClass="emph" presetSubtype="0" grpId="1" nodeType="withEffect">
                                   <p:stCondLst>
                                     <p:cond delay="0"/>
                                   </p:stCondLst>
                                   <p:childTnLst>
                                     <p:set>
                                       <p:cBhvr rctx="PPT">
-                                        <p:cTn id="19" dur="indefinite"/>
+                                        <p:cTn id="25" dur="indefinite"/>
                                         <p:tgtEl>
                                           <p:spTgt spid="6">
                                             <p:txEl>
@@ -5065,7 +5217,7 @@
                                     </p:set>
                                     <p:animEffect filter="image" prLst="opacity: 0.5">
                                       <p:cBhvr rctx="IE">
-                                        <p:cTn id="20" dur="indefinite"/>
+                                        <p:cTn id="26" dur="indefinite"/>
                                         <p:tgtEl>
                                           <p:spTgt spid="6">
                                             <p:txEl>
@@ -5078,26 +5230,53 @@
                                   </p:childTnLst>
                                 </p:cTn>
                               </p:par>
+                              <p:par>
+                                <p:cTn id="27" presetID="1" presetClass="entr" presetSubtype="0" fill="hold" nodeType="withEffect">
+                                  <p:stCondLst>
+                                    <p:cond delay="0"/>
+                                  </p:stCondLst>
+                                  <p:childTnLst>
+                                    <p:set>
+                                      <p:cBhvr>
+                                        <p:cTn id="28" dur="1" fill="hold">
+                                          <p:stCondLst>
+                                            <p:cond delay="0"/>
+                                          </p:stCondLst>
+                                        </p:cTn>
+                                        <p:tgtEl>
+                                          <p:spTgt spid="13"/>
+                                        </p:tgtEl>
+                                        <p:attrNameLst>
+                                          <p:attrName>style.visibility</p:attrName>
+                                        </p:attrNameLst>
+                                      </p:cBhvr>
+                                      <p:to>
+                                        <p:strVal val="visible"/>
+                                      </p:to>
+                                    </p:set>
+                                  </p:childTnLst>
+                                </p:cTn>
+                              </p:par>
                             </p:childTnLst>
                           </p:cTn>
                         </p:par>
                         <p:par>
-                          <p:cTn id="21" fill="hold">
+                          <p:cTn id="29" fill="hold">
                             <p:stCondLst>
                               <p:cond delay="500"/>
                             </p:stCondLst>
                             <p:childTnLst>
                               <p:par>
-                                <p:cTn id="22" presetID="1" presetClass="mediacall" presetSubtype="0" fill="hold" nodeType="afterEffect">
+                                <p:cTn id="30" presetID="1" presetClass="mediacall" presetSubtype="0" fill="hold" nodeType="afterEffect">
                                   <p:stCondLst>
                                     <p:cond delay="0"/>
                                   </p:stCondLst>
                                   <p:childTnLst>
                                     <p:cmd type="call" cmd="playFrom(0.0)">
                                       <p:cBhvr>
-                                        <p:cTn id="23" dur="6666" fill="hold"/>
+                                        <p:cTn id="31" dur="14625" fill="hold"/>
                                         <p:tgtEl>
-                                          <p:spTgt spid="9"/>
+                                          <p:spTgt spid="13"/>
                                         </p:tgtEl>
                                       </p:cBhvr>
                                     </p:cmd>
@@ -5105,20 +5284,20 @@
                                 </p:cTn>
                               </p:par>
                               <p:par>
-                                <p:cTn id="24" presetID="1" presetClass="exit" presetSubtype="0" fill="hold" nodeType="withEffect">
+                                <p:cTn id="32" presetID="1" presetClass="exit" presetSubtype="0" fill="hold" nodeType="withEffect">
                                   <p:stCondLst>
                                     <p:cond delay="0"/>
                                   </p:stCondLst>
                                   <p:childTnLst>
                                     <p:set>
                                       <p:cBhvr>
-                                        <p:cTn id="25" dur="1" fill="hold">
+                                        <p:cTn id="33" dur="1" fill="hold">
                                           <p:stCondLst>
                                             <p:cond delay="0"/>
                                           </p:stCondLst>
                                         </p:cTn>
                                         <p:tgtEl>
-                                          <p:spTgt spid="7"/>
+                                          <p:spTgt spid="2"/>
                                         </p:tgtEl>
                                         <p:attrNameLst>
                                           <p:attrName>style.visibility</p:attrName>
@@ -5130,13 +5309,130 @@
                                     </p:set>
                                     <p:cmd type="call" cmd="stop">
                                       <p:cBhvr>
-                                        <p:cTn id="26" dur="1">
+                                        <p:cTn id="34" dur="1">
                                           <p:stCondLst>
                                             <p:cond delay="0"/>
                                           </p:stCondLst>
                                         </p:cTn>
                                         <p:tgtEl>
-                                          <p:spTgt spid="7"/>
+                                          <p:spTgt spid="2"/>
+                                        </p:tgtEl>
+                                      </p:cBhvr>
+                                    </p:cmd>
+                                  </p:childTnLst>
+                                </p:cTn>
+                              </p:par>
+                              <p:par>
+                                <p:cTn id="35" presetID="1" presetClass="exit" presetSubtype="0" fill="hold" nodeType="withEffect">
+                                  <p:stCondLst>
+                                    <p:cond delay="0"/>
+                                  </p:stCondLst>
+                                  <p:childTnLst>
+                                    <p:set>
+                                      <p:cBhvr>
+                                        <p:cTn id="36" dur="1" fill="hold">
+                                          <p:stCondLst>
+                                            <p:cond delay="0"/>
+                                          </p:stCondLst>
+                                        </p:cTn>
+                                        <p:tgtEl>
+                                          <p:spTgt spid="3"/>
+                                        </p:tgtEl>
+                                        <p:attrNameLst>
+                                          <p:attrName>style.visibility</p:attrName>
+                                        </p:attrNameLst>
+                                      </p:cBhvr>
+                                      <p:to>
+                                        <p:strVal val="hidden"/>
+                                      </p:to>
+                                    </p:set>
+                                    <p:cmd type="call" cmd="stop">
+                                      <p:cBhvr>
+                                        <p:cTn id="37" dur="1">
+                                          <p:stCondLst>
+                                            <p:cond delay="0"/>
+                                          </p:stCondLst>
+                                        </p:cTn>
+                                        <p:tgtEl>
+                                          <p:spTgt spid="3"/>
+                                        </p:tgtEl>
+                                      </p:cBhvr>
+                                    </p:cmd>
+                                  </p:childTnLst>
+                                </p:cTn>
+                              </p:par>
+                              <p:par>
+                                <p:cTn id="38" presetID="1" presetClass="exit" presetSubtype="0" fill="hold" nodeType="withEffect">
+                                  <p:stCondLst>
+                                    <p:cond delay="0"/>
+                                  </p:stCondLst>
+                                  <p:childTnLst>
+                                    <p:set>
+                                      <p:cBhvr>
+                                        <p:cTn id="39" dur="1" fill="hold">
+                                          <p:stCondLst>
+                                            <p:cond delay="0"/>
+                                          </p:stCondLst>
+                                        </p:cTn>
+                                        <p:tgtEl>
+                                          <p:spTgt spid="5"/>
+                                        </p:tgtEl>
+                                        <p:attrNameLst>
+                                          <p:attrName>style.visibility</p:attrName>
+                                        </p:attrNameLst>
+                                      </p:cBhvr>
+                                      <p:to>
+                                        <p:strVal val="hidden"/>
+                                      </p:to>
+                                    </p:set>
+                                    <p:cmd type="call" cmd="stop">
+                                      <p:cBhvr>
+                                        <p:cTn id="40" dur="1">
+                                          <p:stCondLst>
+                                            <p:cond delay="0"/>
+                                          </p:stCondLst>
+                                        </p:cTn>
+                                        <p:tgtEl>
+                                          <p:spTgt spid="5"/>
+                                        </p:tgtEl>
+                                      </p:cBhvr>
+                                    </p:cmd>
+                                  </p:childTnLst>
+                                </p:cTn>
+                              </p:par>
+                              <p:par>
+                                <p:cTn id="41" presetID="1" presetClass="exit" presetSubtype="0" fill="hold" nodeType="withEffect">
+                                  <p:stCondLst>
+                                    <p:cond delay="0"/>
+                                  </p:stCondLst>
+                                  <p:childTnLst>
+                                    <p:set>
+                                      <p:cBhvr>
+                                        <p:cTn id="42" dur="1" fill="hold">
+                                          <p:stCondLst>
+                                            <p:cond delay="0"/>
+                                          </p:stCondLst>
+                                        </p:cTn>
+                                        <p:tgtEl>
+                                          <p:spTgt spid="8"/>
+                                        </p:tgtEl>
+                                        <p:attrNameLst>
+                                          <p:attrName>style.visibility</p:attrName>
+                                        </p:attrNameLst>
+                                      </p:cBhvr>
+                                      <p:to>
+                                        <p:strVal val="hidden"/>
+                                      </p:to>
+                                    </p:set>
+                                    <p:cmd type="call" cmd="stop">
+                                      <p:cBhvr>
+                                        <p:cTn id="43" dur="1">
+                                          <p:stCondLst>
+                                            <p:cond delay="0"/>
+                                          </p:stCondLst>
+                                        </p:cTn>
+                                        <p:tgtEl>
+                                          <p:spTgt spid="8"/>
                                         </p:tgtEl>
                                       </p:cBhvr>
                                     </p:cmd>
@@ -5150,26 +5446,26 @@
                     </p:cTn>
                   </p:par>
                   <p:par>
-                    <p:cTn id="27" fill="hold">
+                    <p:cTn id="44" fill="hold">
                       <p:stCondLst>
                         <p:cond delay="indefinite"/>
                       </p:stCondLst>
                       <p:childTnLst>
                         <p:par>
-                          <p:cTn id="28" fill="hold">
+                          <p:cTn id="45" fill="hold">
                             <p:stCondLst>
                               <p:cond delay="0"/>
                             </p:stCondLst>
                             <p:childTnLst>
                               <p:par>
-                                <p:cTn id="29" presetID="12" presetClass="entr" presetSubtype="2" fill="hold" grpId="0" nodeType="clickEffect">
+                                <p:cTn id="46" presetID="12" presetClass="entr" presetSubtype="2" fill="hold" grpId="0" nodeType="clickEffect">
                                   <p:stCondLst>
                                     <p:cond delay="0"/>
                                   </p:stCondLst>
                                   <p:childTnLst>
                                     <p:set>
                                       <p:cBhvr>
-                                        <p:cTn id="30" dur="1" fill="hold">
+                                        <p:cTn id="47" dur="1" fill="hold">
                                           <p:stCondLst>
                                             <p:cond delay="0"/>
                                           </p:stCondLst>
@@ -5191,7 +5487,7 @@
                                     </p:set>
                                     <p:anim calcmode="lin" valueType="num">
                                       <p:cBhvr additive="base">
-                                        <p:cTn id="31" dur="500"/>
+                                        <p:cTn id="48" dur="500"/>
                                         <p:tgtEl>
                                           <p:spTgt spid="6">
                                             <p:txEl>
@@ -5218,7 +5514,7 @@
                                     </p:anim>
                                     <p:animEffect transition="in" filter="wipe(left)">
                                       <p:cBhvr>
-                                        <p:cTn id="32" dur="500"/>
+                                        <p:cTn id="49" dur="500"/>
                                         <p:tgtEl>
                                           <p:spTgt spid="6">
                                             <p:txEl>
@@ -5232,14 +5528,14 @@
                                 </p:cTn>
                               </p:par>
                               <p:par>
-                                <p:cTn id="33" presetID="9" presetClass="emph" presetSubtype="0" grpId="1" nodeType="withEffect">
+                                <p:cTn id="50" presetID="9" presetClass="emph" presetSubtype="0" grpId="1" nodeType="withEffect">
                                   <p:stCondLst>
                                     <p:cond delay="0"/>
                                   </p:stCondLst>
                                   <p:childTnLst>
                                     <p:set>
                                       <p:cBhvr rctx="PPT">
-                                        <p:cTn id="34" dur="indefinite"/>
+                                        <p:cTn id="51" dur="indefinite"/>
                                         <p:tgtEl>
                                           <p:spTgt spid="6">
                                             <p:txEl>
@@ -5257,7 +5553,7 @@
                                     </p:set>
                                     <p:animEffect filter="image" prLst="opacity: 0.5">
                                       <p:cBhvr rctx="IE">
-                                        <p:cTn id="35" dur="indefinite"/>
+                                        <p:cTn id="52" dur="indefinite"/>
                                         <p:tgtEl>
                                           <p:spTgt spid="6">
                                             <p:txEl>
@@ -5271,14 +5567,14 @@
                                 </p:cTn>
                               </p:par>
                               <p:par>
-                                <p:cTn id="36" presetID="1" presetClass="entr" presetSubtype="0" fill="hold" grpId="0" nodeType="withEffect">
+                                <p:cTn id="53" presetID="1" presetClass="entr" presetSubtype="0" fill="hold" grpId="0" nodeType="withEffect">
                                   <p:stCondLst>
                                     <p:cond delay="0"/>
                                   </p:stCondLst>
                                   <p:childTnLst>
                                     <p:set>
                                       <p:cBhvr>
-                                        <p:cTn id="37" dur="1" fill="hold">
+                                        <p:cTn id="54" dur="1" fill="hold">
                                           <p:stCondLst>
                                             <p:cond delay="0"/>
                                           </p:stCondLst>
@@ -5298,20 +5594,20 @@
                                 </p:cTn>
                               </p:par>
                               <p:par>
-                                <p:cTn id="38" presetID="1" presetClass="exit" presetSubtype="0" fill="hold" nodeType="withEffect">
+                                <p:cTn id="55" presetID="1" presetClass="exit" presetSubtype="0" fill="hold" nodeType="withEffect">
                                   <p:stCondLst>
                                     <p:cond delay="0"/>
                                   </p:stCondLst>
                                   <p:childTnLst>
                                     <p:set>
                                       <p:cBhvr>
-                                        <p:cTn id="39" dur="1" fill="hold">
+                                        <p:cTn id="56" dur="1" fill="hold">
                                           <p:stCondLst>
                                             <p:cond delay="0"/>
                                           </p:stCondLst>
                                         </p:cTn>
                                         <p:tgtEl>
-                                          <p:spTgt spid="9"/>
+                                          <p:spTgt spid="13"/>
                                         </p:tgtEl>
                                         <p:attrNameLst>
                                           <p:attrName>style.visibility</p:attrName>
@@ -5323,13 +5619,13 @@
                                     </p:set>
                                     <p:cmd type="call" cmd="stop">
                                       <p:cBhvr>
-                                        <p:cTn id="40" dur="1">
+                                        <p:cTn id="57" dur="1">
                                           <p:stCondLst>
                                             <p:cond delay="0"/>
                                           </p:stCondLst>
                                         </p:cTn>
                                         <p:tgtEl>
-                                          <p:spTgt spid="9"/>
+                                          <p:spTgt spid="13"/>
                                         </p:tgtEl>
                                       </p:cBhvr>
                                     </p:cmd>
@@ -5361,22 +5657,22 @@
             </p:seq>
             <p:video>
               <p:cMediaNode vol="80000">
-                <p:cTn id="41" fill="hold" display="0">
+                <p:cTn id="58" fill="hold" display="0">
                   <p:stCondLst>
                     <p:cond delay="indefinite"/>
                   </p:stCondLst>
                 </p:cTn>
                 <p:tgtEl>
-                  <p:spTgt spid="7"/>
+                  <p:spTgt spid="8"/>
                 </p:tgtEl>
               </p:cMediaNode>
             </p:video>
             <p:seq concurrent="1" nextAc="seek">
-              <p:cTn id="42" restart="whenNotActive" fill="hold" evtFilter="cancelBubble" nodeType="interactiveSeq">
+              <p:cTn id="59" restart="whenNotActive" fill="hold" evtFilter="cancelBubble" nodeType="interactiveSeq">
                 <p:stCondLst>
                   <p:cond evt="onClick" delay="0">
                     <p:tgtEl>
-                      <p:spTgt spid="7"/>
+                      <p:spTgt spid="8"/>
                     </p:tgtEl>
                   </p:cond>
                 </p:stCondLst>
@@ -5385,28 +5681,28 @@
                 </p:endSync>
                 <p:childTnLst>
                   <p:par>
-                    <p:cTn id="43" fill="hold">
+                    <p:cTn id="60" fill="hold">
                       <p:stCondLst>
                         <p:cond delay="0"/>
                       </p:stCondLst>
                       <p:childTnLst>
                         <p:par>
-                          <p:cTn id="44" fill="hold">
+                          <p:cTn id="61" fill="hold">
                             <p:stCondLst>
                               <p:cond delay="0"/>
                             </p:stCondLst>
                             <p:childTnLst>
                               <p:par>
-                                <p:cTn id="45" presetID="2" presetClass="mediacall" presetSubtype="0" fill="hold" nodeType="clickEffect">
+                                <p:cTn id="62" presetID="2" presetClass="mediacall" presetSubtype="0" fill="hold" nodeType="clickEffect">
                                   <p:stCondLst>
                                     <p:cond delay="0"/>
                                   </p:stCondLst>
                                   <p:childTnLst>
                                     <p:cmd type="call" cmd="togglePause">
                                       <p:cBhvr>
-                                        <p:cTn id="46" dur="1" fill="hold"/>
+                                        <p:cTn id="63" dur="1" fill="hold"/>
                                         <p:tgtEl>
-                                          <p:spTgt spid="7"/>
+                                          <p:spTgt spid="8"/>
                                         </p:tgtEl>
                                       </p:cBhvr>
                                     </p:cmd>
@@ -5424,29 +5720,29 @@
               <p:nextCondLst>
                 <p:cond evt="onClick" delay="0">
                   <p:tgtEl>
-                    <p:spTgt spid="7"/>
+                    <p:spTgt spid="8"/>
                   </p:tgtEl>
                 </p:cond>
               </p:nextCondLst>
             </p:seq>
             <p:video>
               <p:cMediaNode vol="80000">
-                <p:cTn id="47" fill="hold" display="0">
+                <p:cTn id="64" fill="hold" display="0">
                   <p:stCondLst>
                     <p:cond delay="indefinite"/>
                   </p:stCondLst>
                 </p:cTn>
                 <p:tgtEl>
-                  <p:spTgt spid="9"/>
+                  <p:spTgt spid="5"/>
                 </p:tgtEl>
               </p:cMediaNode>
             </p:video>
             <p:seq concurrent="1" nextAc="seek">
-              <p:cTn id="48" restart="whenNotActive" fill="hold" evtFilter="cancelBubble" nodeType="interactiveSeq">
+              <p:cTn id="65" restart="whenNotActive" fill="hold" evtFilter="cancelBubble" nodeType="interactiveSeq">
                 <p:stCondLst>
                   <p:cond evt="onClick" delay="0">
                     <p:tgtEl>
-                      <p:spTgt spid="9"/>
+                      <p:spTgt spid="5"/>
                     </p:tgtEl>
                   </p:cond>
                 </p:stCondLst>
@@ -5455,28 +5751,28 @@
                 </p:endSync>
                 <p:childTnLst>
                   <p:par>
-                    <p:cTn id="49" fill="hold">
+                    <p:cTn id="66" fill="hold">
                       <p:stCondLst>
                         <p:cond delay="0"/>
                       </p:stCondLst>
                       <p:childTnLst>
                         <p:par>
-                          <p:cTn id="50" fill="hold">
+                          <p:cTn id="67" fill="hold">
                             <p:stCondLst>
                               <p:cond delay="0"/>
                             </p:stCondLst>
                             <p:childTnLst>
                               <p:par>
-                                <p:cTn id="51" presetID="2" presetClass="mediacall" presetSubtype="0" fill="hold" nodeType="clickEffect">
+                                <p:cTn id="68" presetID="2" presetClass="mediacall" presetSubtype="0" fill="hold" nodeType="clickEffect">
                                   <p:stCondLst>
                                     <p:cond delay="0"/>
                                   </p:stCondLst>
                                   <p:childTnLst>
                                     <p:cmd type="call" cmd="togglePause">
                                       <p:cBhvr>
-                                        <p:cTn id="52" dur="1" fill="hold"/>
+                                        <p:cTn id="69" dur="1" fill="hold"/>
                                         <p:tgtEl>
-                                          <p:spTgt spid="9"/>
+                                          <p:spTgt spid="5"/>
                                         </p:tgtEl>
                                       </p:cBhvr>
                                     </p:cmd>
@@ -5494,7 +5790,217 @@
               <p:nextCondLst>
                 <p:cond evt="onClick" delay="0">
                   <p:tgtEl>
-                    <p:spTgt spid="9"/>
+                    <p:spTgt spid="5"/>
+                  </p:tgtEl>
+                </p:cond>
+              </p:nextCondLst>
+            </p:seq>
+            <p:video>
+              <p:cMediaNode vol="80000">
+                <p:cTn id="70" fill="hold" display="0">
+                  <p:stCondLst>
+                    <p:cond delay="indefinite"/>
+                  </p:stCondLst>
+                </p:cTn>
+                <p:tgtEl>
+                  <p:spTgt spid="3"/>
+                </p:tgtEl>
+              </p:cMediaNode>
+            </p:video>
+            <p:seq concurrent="1" nextAc="seek">
+              <p:cTn id="71" restart="whenNotActive" fill="hold" evtFilter="cancelBubble" nodeType="interactiveSeq">
+                <p:stCondLst>
+                  <p:cond evt="onClick" delay="0">
+                    <p:tgtEl>
+                      <p:spTgt spid="3"/>
+                    </p:tgtEl>
+                  </p:cond>
+                </p:stCondLst>
+                <p:endSync evt="end" delay="0">
+                  <p:rtn val="all"/>
+                </p:endSync>
+                <p:childTnLst>
+                  <p:par>
+                    <p:cTn id="72" fill="hold">
+                      <p:stCondLst>
+                        <p:cond delay="0"/>
+                      </p:stCondLst>
+                      <p:childTnLst>
+                        <p:par>
+                          <p:cTn id="73" fill="hold">
+                            <p:stCondLst>
+                              <p:cond delay="0"/>
+                            </p:stCondLst>
+                            <p:childTnLst>
+                              <p:par>
+                                <p:cTn id="74" presetID="2" presetClass="mediacall" presetSubtype="0" fill="hold" nodeType="clickEffect">
+                                  <p:stCondLst>
+                                    <p:cond delay="0"/>
+                                  </p:stCondLst>
+                                  <p:childTnLst>
+                                    <p:cmd type="call" cmd="togglePause">
+                                      <p:cBhvr>
+                                        <p:cTn id="75" dur="1" fill="hold"/>
+                                        <p:tgtEl>
+                                          <p:spTgt spid="3"/>
+                                        </p:tgtEl>
+                                      </p:cBhvr>
+                                    </p:cmd>
+                                  </p:childTnLst>
+                                </p:cTn>
+                              </p:par>
+                            </p:childTnLst>
+                          </p:cTn>
+                        </p:par>
+                      </p:childTnLst>
+                    </p:cTn>
+                  </p:par>
+                </p:childTnLst>
+              </p:cTn>
+              <p:nextCondLst>
+                <p:cond evt="onClick" delay="0">
+                  <p:tgtEl>
+                    <p:spTgt spid="3"/>
+                  </p:tgtEl>
+                </p:cond>
+              </p:nextCondLst>
+            </p:seq>
+            <p:video>
+              <p:cMediaNode vol="80000">
+                <p:cTn id="76" fill="hold" display="0">
+                  <p:stCondLst>
+                    <p:cond delay="indefinite"/>
+                  </p:stCondLst>
+                </p:cTn>
+                <p:tgtEl>
+                  <p:spTgt spid="2"/>
+                </p:tgtEl>
+              </p:cMediaNode>
+            </p:video>
+            <p:seq concurrent="1" nextAc="seek">
+              <p:cTn id="77" restart="whenNotActive" fill="hold" evtFilter="cancelBubble" nodeType="interactiveSeq">
+                <p:stCondLst>
+                  <p:cond evt="onClick" delay="0">
+                    <p:tgtEl>
+                      <p:spTgt spid="2"/>
+                    </p:tgtEl>
+                  </p:cond>
+                </p:stCondLst>
+                <p:endSync evt="end" delay="0">
+                  <p:rtn val="all"/>
+                </p:endSync>
+                <p:childTnLst>
+                  <p:par>
+                    <p:cTn id="78" fill="hold">
+                      <p:stCondLst>
+                        <p:cond delay="0"/>
+                      </p:stCondLst>
+                      <p:childTnLst>
+                        <p:par>
+                          <p:cTn id="79" fill="hold">
+                            <p:stCondLst>
+                              <p:cond delay="0"/>
+                            </p:stCondLst>
+                            <p:childTnLst>
+                              <p:par>
+                                <p:cTn id="80" presetID="2" presetClass="mediacall" presetSubtype="0" fill="hold" nodeType="clickEffect">
+                                  <p:stCondLst>
+                                    <p:cond delay="0"/>
+                                  </p:stCondLst>
+                                  <p:childTnLst>
+                                    <p:cmd type="call" cmd="togglePause">
+                                      <p:cBhvr>
+                                        <p:cTn id="81" dur="1" fill="hold"/>
+                                        <p:tgtEl>
+                                          <p:spTgt spid="2"/>
+                                        </p:tgtEl>
+                                      </p:cBhvr>
+                                    </p:cmd>
+                                  </p:childTnLst>
+                                </p:cTn>
+                              </p:par>
+                            </p:childTnLst>
+                          </p:cTn>
+                        </p:par>
+                      </p:childTnLst>
+                    </p:cTn>
+                  </p:par>
+                </p:childTnLst>
+              </p:cTn>
+              <p:nextCondLst>
+                <p:cond evt="onClick" delay="0">
+                  <p:tgtEl>
+                    <p:spTgt spid="2"/>
+                  </p:tgtEl>
+                </p:cond>
+              </p:nextCondLst>
+            </p:seq>
+            <p:video>
+              <p:cMediaNode vol="80000">
+                <p:cTn id="82" fill="hold" display="0">
+                  <p:stCondLst>
+                    <p:cond delay="indefinite"/>
+                  </p:stCondLst>
+                </p:cTn>
+                <p:tgtEl>
+                  <p:spTgt spid="13"/>
+                </p:tgtEl>
+              </p:cMediaNode>
+            </p:video>
+            <p:seq concurrent="1" nextAc="seek">
+              <p:cTn id="83" restart="whenNotActive" fill="hold" evtFilter="cancelBubble" nodeType="interactiveSeq">
+                <p:stCondLst>
+                  <p:cond evt="onClick" delay="0">
+                    <p:tgtEl>
+                      <p:spTgt spid="13"/>
+                    </p:tgtEl>
+                  </p:cond>
+                </p:stCondLst>
+                <p:endSync evt="end" delay="0">
+                  <p:rtn val="all"/>
+                </p:endSync>
+                <p:childTnLst>
+                  <p:par>
+                    <p:cTn id="84" fill="hold">
+                      <p:stCondLst>
+                        <p:cond delay="0"/>
+                      </p:stCondLst>
+                      <p:childTnLst>
+                        <p:par>
+                          <p:cTn id="85" fill="hold">
+                            <p:stCondLst>
+                              <p:cond delay="0"/>
+                            </p:stCondLst>
+                            <p:childTnLst>
+                              <p:par>
+                                <p:cTn id="86" presetID="2" presetClass="mediacall" presetSubtype="0" fill="hold" nodeType="clickEffect">
+                                  <p:stCondLst>
+                                    <p:cond delay="0"/>
+                                  </p:stCondLst>
+                                  <p:childTnLst>
+                                    <p:cmd type="call" cmd="togglePause">
+                                      <p:cBhvr>
+                                        <p:cTn id="87" dur="1" fill="hold"/>
+                                        <p:tgtEl>
+                                          <p:spTgt spid="13"/>
+                                        </p:tgtEl>
+                                      </p:cBhvr>
+                                    </p:cmd>
+                                  </p:childTnLst>
+                                </p:cTn>
+                              </p:par>
+                            </p:childTnLst>
+                          </p:cTn>
+                        </p:par>
+                      </p:childTnLst>
+                    </p:cTn>
+                  </p:par>
+                </p:childTnLst>
+              </p:cTn>
+              <p:nextCondLst>
+                <p:cond evt="onClick" delay="0">
+                  <p:tgtEl>
+                    <p:spTgt spid="13"/>
                   </p:tgtEl>
                 </p:cond>
               </p:nextCondLst>
@@ -5571,8 +6077,8 @@
           </a:p>
         </p:txBody>
       </p:sp>
-      <mc:AlternateContent xmlns:mc="http://schemas.openxmlformats.org/markup-compatibility/2006" xmlns:a14="http://schemas.microsoft.com/office/drawing/2010/main">
-        <mc:Choice Requires="a14">
+      <mc:AlternateContent xmlns:mc="http://schemas.openxmlformats.org/markup-compatibility/2006">
+        <mc:Choice xmlns:a14="http://schemas.microsoft.com/office/drawing/2010/main" Requires="a14">
           <p:sp>
             <p:nvSpPr>
               <p:cNvPr id="10" name="Text Placeholder 9"/>
@@ -5727,7 +6233,7 @@
             </p:txBody>
           </p:sp>
         </mc:Choice>
-        <mc:Fallback xmlns="">
+        <mc:Fallback>
           <p:sp>
             <p:nvSpPr>
               <p:cNvPr id="10" name="Text Placeholder 9"/>
@@ -6093,8 +6599,8 @@
           </a:p>
         </p:txBody>
       </p:sp>
-      <mc:AlternateContent xmlns:mc="http://schemas.openxmlformats.org/markup-compatibility/2006" xmlns:a14="http://schemas.microsoft.com/office/drawing/2010/main">
-        <mc:Choice Requires="a14">
+      <mc:AlternateContent xmlns:mc="http://schemas.openxmlformats.org/markup-compatibility/2006">
+        <mc:Choice xmlns:a14="http://schemas.microsoft.com/office/drawing/2010/main" Requires="a14">
           <p:sp>
             <p:nvSpPr>
               <p:cNvPr id="2" name="TextBox 1"/>
@@ -6138,7 +6644,7 @@
             </p:txBody>
           </p:sp>
         </mc:Choice>
-        <mc:Fallback xmlns="">
+        <mc:Fallback>
           <p:sp>
             <p:nvSpPr>
               <p:cNvPr id="2" name="TextBox 1"/>
@@ -6177,8 +6683,8 @@
           </p:sp>
         </mc:Fallback>
       </mc:AlternateContent>
-      <mc:AlternateContent xmlns:mc="http://schemas.openxmlformats.org/markup-compatibility/2006" xmlns:a14="http://schemas.microsoft.com/office/drawing/2010/main">
-        <mc:Choice Requires="a14">
+      <mc:AlternateContent xmlns:mc="http://schemas.openxmlformats.org/markup-compatibility/2006">
+        <mc:Choice xmlns:a14="http://schemas.microsoft.com/office/drawing/2010/main" Requires="a14">
           <p:sp>
             <p:nvSpPr>
               <p:cNvPr id="9" name="TextBox 8"/>
@@ -6288,7 +6794,7 @@
             </p:txBody>
           </p:sp>
         </mc:Choice>
-        <mc:Fallback xmlns="">
+        <mc:Fallback>
           <p:sp>
             <p:nvSpPr>
               <p:cNvPr id="9" name="TextBox 8"/>
@@ -6327,8 +6833,8 @@
           </p:sp>
         </mc:Fallback>
       </mc:AlternateContent>
-      <mc:AlternateContent xmlns:mc="http://schemas.openxmlformats.org/markup-compatibility/2006" xmlns:a14="http://schemas.microsoft.com/office/drawing/2010/main">
-        <mc:Choice Requires="a14">
+      <mc:AlternateContent xmlns:mc="http://schemas.openxmlformats.org/markup-compatibility/2006">
+        <mc:Choice xmlns:a14="http://schemas.microsoft.com/office/drawing/2010/main" Requires="a14">
           <p:sp>
             <p:nvSpPr>
               <p:cNvPr id="13" name="TextBox 12"/>
@@ -6372,7 +6878,7 @@
             </p:txBody>
           </p:sp>
         </mc:Choice>
-        <mc:Fallback xmlns="">
+        <mc:Fallback>
           <p:sp>
             <p:nvSpPr>
               <p:cNvPr id="13" name="TextBox 12"/>
@@ -6411,8 +6917,8 @@
           </p:sp>
         </mc:Fallback>
       </mc:AlternateContent>
-      <mc:AlternateContent xmlns:mc="http://schemas.openxmlformats.org/markup-compatibility/2006" xmlns:a14="http://schemas.microsoft.com/office/drawing/2010/main">
-        <mc:Choice Requires="a14">
+      <mc:AlternateContent xmlns:mc="http://schemas.openxmlformats.org/markup-compatibility/2006">
+        <mc:Choice xmlns:a14="http://schemas.microsoft.com/office/drawing/2010/main" Requires="a14">
           <p:sp>
             <p:nvSpPr>
               <p:cNvPr id="14" name="TextBox 13"/>
@@ -6464,7 +6970,7 @@
             </p:txBody>
           </p:sp>
         </mc:Choice>
-        <mc:Fallback xmlns="">
+        <mc:Fallback>
           <p:sp>
             <p:nvSpPr>
               <p:cNvPr id="14" name="TextBox 13"/>
@@ -6503,8 +7009,8 @@
           </p:sp>
         </mc:Fallback>
       </mc:AlternateContent>
-      <mc:AlternateContent xmlns:mc="http://schemas.openxmlformats.org/markup-compatibility/2006" xmlns:a14="http://schemas.microsoft.com/office/drawing/2010/main">
-        <mc:Choice Requires="a14">
+      <mc:AlternateContent xmlns:mc="http://schemas.openxmlformats.org/markup-compatibility/2006">
+        <mc:Choice xmlns:a14="http://schemas.microsoft.com/office/drawing/2010/main" Requires="a14">
           <p:sp>
             <p:nvSpPr>
               <p:cNvPr id="11" name="TextBox 10"/>
@@ -6548,7 +7054,7 @@
             </p:txBody>
           </p:sp>
         </mc:Choice>
-        <mc:Fallback xmlns="">
+        <mc:Fallback>
           <p:sp>
             <p:nvSpPr>
               <p:cNvPr id="11" name="TextBox 10"/>
@@ -7883,16 +8389,66 @@
             <p:ph type="title"/>
           </p:nvPr>
         </p:nvSpPr>
+        <p:spPr>
+          <a:xfrm>
+            <a:off x="629840" y="457200"/>
+            <a:ext cx="7887097" cy="1600200"/>
+          </a:xfrm>
+        </p:spPr>
+        <p:txBody>
+          <a:bodyPr>
+            <a:normAutofit/>
+          </a:bodyPr>
+          <a:lstStyle/>
+          <a:p>
+            <a:r>
+              <a:rPr lang="en-GB" sz="3600" dirty="0" smtClean="0"/>
+              <a:t>When do the current assumptions fail?</a:t>
+            </a:r>
+            <a:endParaRPr lang="en-GB" sz="3600" dirty="0"/>
+          </a:p>
+        </p:txBody>
+      </p:sp>
+      <p:sp>
+        <p:nvSpPr>
+          <p:cNvPr id="9" name="Text Placeholder 8"/>
+          <p:cNvSpPr>
+            <a:spLocks noGrp="1"/>
+          </p:cNvSpPr>
+          <p:nvPr>
+            <p:ph type="body" sz="half" idx="2"/>
+          </p:nvPr>
+        </p:nvSpPr>
         <p:spPr/>
         <p:txBody>
-          <a:bodyPr/>
+          <a:bodyPr>
+            <a:normAutofit/>
+          </a:bodyPr>
           <a:lstStyle/>
           <a:p>
             <a:r>
-              <a:rPr lang="en-GB" dirty="0" smtClean="0"/>
-              <a:t>Our assumptions</a:t>
-            </a:r>
-            <a:endParaRPr lang="en-GB" dirty="0"/>
+              <a:rPr lang="en-GB" sz="2400" dirty="0" smtClean="0"/>
+              <a:t>Let’s consider a simple structure</a:t>
+            </a:r>
+          </a:p>
+          <a:p>
+            <a:endParaRPr lang="en-GB" sz="2400" dirty="0"/>
+          </a:p>
+          <a:p>
+            <a:r>
+              <a:rPr lang="en-GB" sz="2400" dirty="0" smtClean="0"/>
+              <a:t>and a particular order of deformation</a:t>
+            </a:r>
+          </a:p>
+          <a:p>
+            <a:endParaRPr lang="en-GB" sz="2400" dirty="0"/>
+          </a:p>
+          <a:p>
+            <a:pPr marL="342900" indent="-342900">
+              <a:buFont typeface="Arial" charset="0"/>
+              <a:buChar char="•"/>
+            </a:pPr>
+            <a:endParaRPr lang="en-GB" sz="2400" dirty="0" smtClean="0"/>
           </a:p>
         </p:txBody>
       </p:sp>
@@ -7919,6 +8475,932 @@
           </a:p>
         </p:txBody>
       </p:sp>
+      <p:pic>
+        <p:nvPicPr>
+          <p:cNvPr id="2" name="step0"/>
+          <p:cNvPicPr>
+            <a:picLocks noGrp="1" noChangeAspect="1"/>
+          </p:cNvPicPr>
+          <p:nvPr>
+            <p:ph idx="1"/>
+          </p:nvPr>
+        </p:nvPicPr>
+        <p:blipFill>
+          <a:blip r:embed="rId2">
+            <a:extLst>
+              <a:ext uri="{28A0092B-C50C-407E-A947-70E740481C1C}">
+                <a14:useLocalDpi xmlns:a14="http://schemas.microsoft.com/office/drawing/2010/main" val="0"/>
+              </a:ext>
+            </a:extLst>
+          </a:blip>
+          <a:stretch>
+            <a:fillRect/>
+          </a:stretch>
+        </p:blipFill>
+        <p:spPr>
+          <a:xfrm>
+            <a:off x="3887788" y="2185323"/>
+            <a:ext cx="4629150" cy="2477828"/>
+          </a:xfrm>
+        </p:spPr>
+      </p:pic>
+      <p:pic>
+        <p:nvPicPr>
+          <p:cNvPr id="7" name="step1"/>
+          <p:cNvPicPr>
+            <a:picLocks noChangeAspect="1"/>
+          </p:cNvPicPr>
+          <p:nvPr/>
+        </p:nvPicPr>
+        <p:blipFill>
+          <a:blip r:embed="rId3">
+            <a:extLst>
+              <a:ext uri="{28A0092B-C50C-407E-A947-70E740481C1C}">
+                <a14:useLocalDpi xmlns:a14="http://schemas.microsoft.com/office/drawing/2010/main" val="0"/>
+              </a:ext>
+            </a:extLst>
+          </a:blip>
+          <a:stretch>
+            <a:fillRect/>
+          </a:stretch>
+        </p:blipFill>
+        <p:spPr>
+          <a:xfrm>
+            <a:off x="3887789" y="2185323"/>
+            <a:ext cx="4629148" cy="2477828"/>
+          </a:xfrm>
+          <a:prstGeom prst="rect">
+            <a:avLst/>
+          </a:prstGeom>
+        </p:spPr>
+      </p:pic>
+      <p:pic>
+        <p:nvPicPr>
+          <p:cNvPr id="10" name="after step1" hidden="1"/>
+          <p:cNvPicPr>
+            <a:picLocks noChangeAspect="1"/>
+          </p:cNvPicPr>
+          <p:nvPr/>
+        </p:nvPicPr>
+        <p:blipFill>
+          <a:blip r:embed="rId4">
+            <a:extLst>
+              <a:ext uri="{28A0092B-C50C-407E-A947-70E740481C1C}">
+                <a14:useLocalDpi xmlns:a14="http://schemas.microsoft.com/office/drawing/2010/main" val="0"/>
+              </a:ext>
+            </a:extLst>
+          </a:blip>
+          <a:stretch>
+            <a:fillRect/>
+          </a:stretch>
+        </p:blipFill>
+        <p:spPr>
+          <a:xfrm>
+            <a:off x="3887789" y="2185323"/>
+            <a:ext cx="4629148" cy="2477828"/>
+          </a:xfrm>
+          <a:prstGeom prst="rect">
+            <a:avLst/>
+          </a:prstGeom>
+        </p:spPr>
+      </p:pic>
+      <p:pic>
+        <p:nvPicPr>
+          <p:cNvPr id="11" name="step2a" hidden="1"/>
+          <p:cNvPicPr>
+            <a:picLocks noChangeAspect="1"/>
+          </p:cNvPicPr>
+          <p:nvPr/>
+        </p:nvPicPr>
+        <p:blipFill>
+          <a:blip r:embed="rId5">
+            <a:extLst>
+              <a:ext uri="{28A0092B-C50C-407E-A947-70E740481C1C}">
+                <a14:useLocalDpi xmlns:a14="http://schemas.microsoft.com/office/drawing/2010/main" val="0"/>
+              </a:ext>
+            </a:extLst>
+          </a:blip>
+          <a:stretch>
+            <a:fillRect/>
+          </a:stretch>
+        </p:blipFill>
+        <p:spPr>
+          <a:xfrm>
+            <a:off x="3887789" y="2185323"/>
+            <a:ext cx="4629148" cy="2477828"/>
+          </a:xfrm>
+          <a:prstGeom prst="rect">
+            <a:avLst/>
+          </a:prstGeom>
+        </p:spPr>
+      </p:pic>
+      <p:pic>
+        <p:nvPicPr>
+          <p:cNvPr id="12" name="step2b" hidden="1"/>
+          <p:cNvPicPr>
+            <a:picLocks noChangeAspect="1"/>
+          </p:cNvPicPr>
+          <p:nvPr/>
+        </p:nvPicPr>
+        <p:blipFill>
+          <a:blip r:embed="rId6">
+            <a:extLst>
+              <a:ext uri="{28A0092B-C50C-407E-A947-70E740481C1C}">
+                <a14:useLocalDpi xmlns:a14="http://schemas.microsoft.com/office/drawing/2010/main" val="0"/>
+              </a:ext>
+            </a:extLst>
+          </a:blip>
+          <a:stretch>
+            <a:fillRect/>
+          </a:stretch>
+        </p:blipFill>
+        <p:spPr>
+          <a:xfrm>
+            <a:off x="3887789" y="2185323"/>
+            <a:ext cx="4629148" cy="2477828"/>
+          </a:xfrm>
+          <a:prstGeom prst="rect">
+            <a:avLst/>
+          </a:prstGeom>
+        </p:spPr>
+      </p:pic>
+      <p:pic>
+        <p:nvPicPr>
+          <p:cNvPr id="13" name="step2c" hidden="1"/>
+          <p:cNvPicPr>
+            <a:picLocks noChangeAspect="1"/>
+          </p:cNvPicPr>
+          <p:nvPr/>
+        </p:nvPicPr>
+        <p:blipFill>
+          <a:blip r:embed="rId7">
+            <a:extLst>
+              <a:ext uri="{28A0092B-C50C-407E-A947-70E740481C1C}">
+                <a14:useLocalDpi xmlns:a14="http://schemas.microsoft.com/office/drawing/2010/main" val="0"/>
+              </a:ext>
+            </a:extLst>
+          </a:blip>
+          <a:stretch>
+            <a:fillRect/>
+          </a:stretch>
+        </p:blipFill>
+        <p:spPr>
+          <a:xfrm>
+            <a:off x="3887789" y="2185323"/>
+            <a:ext cx="4629148" cy="2477828"/>
+          </a:xfrm>
+          <a:prstGeom prst="rect">
+            <a:avLst/>
+          </a:prstGeom>
+        </p:spPr>
+      </p:pic>
+      <p:pic>
+        <p:nvPicPr>
+          <p:cNvPr id="14" name="step2d" hidden="1"/>
+          <p:cNvPicPr>
+            <a:picLocks noChangeAspect="1"/>
+          </p:cNvPicPr>
+          <p:nvPr/>
+        </p:nvPicPr>
+        <p:blipFill>
+          <a:blip r:embed="rId8">
+            <a:extLst>
+              <a:ext uri="{28A0092B-C50C-407E-A947-70E740481C1C}">
+                <a14:useLocalDpi xmlns:a14="http://schemas.microsoft.com/office/drawing/2010/main" val="0"/>
+              </a:ext>
+            </a:extLst>
+          </a:blip>
+          <a:stretch>
+            <a:fillRect/>
+          </a:stretch>
+        </p:blipFill>
+        <p:spPr>
+          <a:xfrm>
+            <a:off x="3887789" y="2185323"/>
+            <a:ext cx="4629148" cy="2477828"/>
+          </a:xfrm>
+          <a:prstGeom prst="rect">
+            <a:avLst/>
+          </a:prstGeom>
+        </p:spPr>
+      </p:pic>
+      <p:pic>
+        <p:nvPicPr>
+          <p:cNvPr id="16" name="break 1" hidden="1"/>
+          <p:cNvPicPr>
+            <a:picLocks noChangeAspect="1"/>
+          </p:cNvPicPr>
+          <p:nvPr/>
+        </p:nvPicPr>
+        <p:blipFill>
+          <a:blip r:embed="rId9">
+            <a:extLst>
+              <a:ext uri="{28A0092B-C50C-407E-A947-70E740481C1C}">
+                <a14:useLocalDpi xmlns:a14="http://schemas.microsoft.com/office/drawing/2010/main" val="0"/>
+              </a:ext>
+            </a:extLst>
+          </a:blip>
+          <a:stretch>
+            <a:fillRect/>
+          </a:stretch>
+        </p:blipFill>
+        <p:spPr>
+          <a:xfrm>
+            <a:off x="3887789" y="2185323"/>
+            <a:ext cx="4629148" cy="2477828"/>
+          </a:xfrm>
+          <a:prstGeom prst="rect">
+            <a:avLst/>
+          </a:prstGeom>
+        </p:spPr>
+      </p:pic>
+      <p:pic>
+        <p:nvPicPr>
+          <p:cNvPr id="17" name="break 2" hidden="1"/>
+          <p:cNvPicPr>
+            <a:picLocks noChangeAspect="1"/>
+          </p:cNvPicPr>
+          <p:nvPr/>
+        </p:nvPicPr>
+        <p:blipFill>
+          <a:blip r:embed="rId10">
+            <a:extLst>
+              <a:ext uri="{28A0092B-C50C-407E-A947-70E740481C1C}">
+                <a14:useLocalDpi xmlns:a14="http://schemas.microsoft.com/office/drawing/2010/main" val="0"/>
+              </a:ext>
+            </a:extLst>
+          </a:blip>
+          <a:stretch>
+            <a:fillRect/>
+          </a:stretch>
+        </p:blipFill>
+        <p:spPr>
+          <a:xfrm>
+            <a:off x="3887789" y="2185323"/>
+            <a:ext cx="4629148" cy="2477828"/>
+          </a:xfrm>
+          <a:prstGeom prst="rect">
+            <a:avLst/>
+          </a:prstGeom>
+        </p:spPr>
+      </p:pic>
+      <p:pic>
+        <p:nvPicPr>
+          <p:cNvPr id="18" name="do not 1" hidden="1"/>
+          <p:cNvPicPr>
+            <a:picLocks noChangeAspect="1"/>
+          </p:cNvPicPr>
+          <p:nvPr/>
+        </p:nvPicPr>
+        <p:blipFill>
+          <a:blip r:embed="rId11">
+            <a:extLst>
+              <a:ext uri="{28A0092B-C50C-407E-A947-70E740481C1C}">
+                <a14:useLocalDpi xmlns:a14="http://schemas.microsoft.com/office/drawing/2010/main" val="0"/>
+              </a:ext>
+            </a:extLst>
+          </a:blip>
+          <a:stretch>
+            <a:fillRect/>
+          </a:stretch>
+        </p:blipFill>
+        <p:spPr>
+          <a:xfrm>
+            <a:off x="3887789" y="2185323"/>
+            <a:ext cx="4629148" cy="2477828"/>
+          </a:xfrm>
+          <a:prstGeom prst="rect">
+            <a:avLst/>
+          </a:prstGeom>
+        </p:spPr>
+      </p:pic>
+      <p:pic>
+        <p:nvPicPr>
+          <p:cNvPr id="19" name="do not 2" hidden="1"/>
+          <p:cNvPicPr>
+            <a:picLocks noChangeAspect="1"/>
+          </p:cNvPicPr>
+          <p:nvPr/>
+        </p:nvPicPr>
+        <p:blipFill>
+          <a:blip r:embed="rId12">
+            <a:extLst>
+              <a:ext uri="{28A0092B-C50C-407E-A947-70E740481C1C}">
+                <a14:useLocalDpi xmlns:a14="http://schemas.microsoft.com/office/drawing/2010/main" val="0"/>
+              </a:ext>
+            </a:extLst>
+          </a:blip>
+          <a:stretch>
+            <a:fillRect/>
+          </a:stretch>
+        </p:blipFill>
+        <p:spPr>
+          <a:xfrm>
+            <a:off x="3887789" y="2185323"/>
+            <a:ext cx="4629148" cy="2477828"/>
+          </a:xfrm>
+          <a:prstGeom prst="rect">
+            <a:avLst/>
+          </a:prstGeom>
+        </p:spPr>
+      </p:pic>
+      <p:sp>
+        <p:nvSpPr>
+          <p:cNvPr id="20" name="text the connection is now rigid" hidden="1"/>
+          <p:cNvSpPr txBox="1">
+            <a:spLocks/>
+          </p:cNvSpPr>
+          <p:nvPr/>
+        </p:nvSpPr>
+        <p:spPr>
+          <a:xfrm>
+            <a:off x="629841" y="2057400"/>
+            <a:ext cx="2949178" cy="3811588"/>
+          </a:xfrm>
+          <a:prstGeom prst="rect">
+            <a:avLst/>
+          </a:prstGeom>
+        </p:spPr>
+        <p:txBody>
+          <a:bodyPr vert="horz" lIns="91440" tIns="45720" rIns="91440" bIns="45720" rtlCol="0">
+            <a:normAutofit/>
+          </a:bodyPr>
+          <a:lstStyle>
+            <a:lvl1pPr marL="0" indent="0" algn="l" defTabSz="685800" rtl="0" eaLnBrk="1" latinLnBrk="0" hangingPunct="1">
+              <a:lnSpc>
+                <a:spcPct val="90000"/>
+              </a:lnSpc>
+              <a:spcBef>
+                <a:spcPts val="750"/>
+              </a:spcBef>
+              <a:buFont typeface="Arial"/>
+              <a:buNone/>
+              <a:defRPr sz="1200" kern="1200">
+                <a:solidFill>
+                  <a:schemeClr val="tx1"/>
+                </a:solidFill>
+                <a:latin typeface="+mn-lt"/>
+                <a:ea typeface="+mn-ea"/>
+                <a:cs typeface="+mn-cs"/>
+              </a:defRPr>
+            </a:lvl1pPr>
+            <a:lvl2pPr marL="342900" indent="0" algn="l" defTabSz="685800" rtl="0" eaLnBrk="1" latinLnBrk="0" hangingPunct="1">
+              <a:lnSpc>
+                <a:spcPct val="90000"/>
+              </a:lnSpc>
+              <a:spcBef>
+                <a:spcPts val="375"/>
+              </a:spcBef>
+              <a:buFont typeface="Arial"/>
+              <a:buNone/>
+              <a:defRPr sz="1050" kern="1200">
+                <a:solidFill>
+                  <a:schemeClr val="tx1"/>
+                </a:solidFill>
+                <a:latin typeface="+mn-lt"/>
+                <a:ea typeface="+mn-ea"/>
+                <a:cs typeface="+mn-cs"/>
+              </a:defRPr>
+            </a:lvl2pPr>
+            <a:lvl3pPr marL="685800" indent="0" algn="l" defTabSz="685800" rtl="0" eaLnBrk="1" latinLnBrk="0" hangingPunct="1">
+              <a:lnSpc>
+                <a:spcPct val="90000"/>
+              </a:lnSpc>
+              <a:spcBef>
+                <a:spcPts val="375"/>
+              </a:spcBef>
+              <a:buFont typeface="Arial"/>
+              <a:buNone/>
+              <a:defRPr sz="900" kern="1200">
+                <a:solidFill>
+                  <a:schemeClr val="tx1"/>
+                </a:solidFill>
+                <a:latin typeface="+mn-lt"/>
+                <a:ea typeface="+mn-ea"/>
+                <a:cs typeface="+mn-cs"/>
+              </a:defRPr>
+            </a:lvl3pPr>
+            <a:lvl4pPr marL="1028700" indent="0" algn="l" defTabSz="685800" rtl="0" eaLnBrk="1" latinLnBrk="0" hangingPunct="1">
+              <a:lnSpc>
+                <a:spcPct val="90000"/>
+              </a:lnSpc>
+              <a:spcBef>
+                <a:spcPts val="375"/>
+              </a:spcBef>
+              <a:buFont typeface="Arial"/>
+              <a:buNone/>
+              <a:defRPr sz="750" kern="1200">
+                <a:solidFill>
+                  <a:schemeClr val="tx1"/>
+                </a:solidFill>
+                <a:latin typeface="+mn-lt"/>
+                <a:ea typeface="+mn-ea"/>
+                <a:cs typeface="+mn-cs"/>
+              </a:defRPr>
+            </a:lvl4pPr>
+            <a:lvl5pPr marL="1371600" indent="0" algn="l" defTabSz="685800" rtl="0" eaLnBrk="1" latinLnBrk="0" hangingPunct="1">
+              <a:lnSpc>
+                <a:spcPct val="90000"/>
+              </a:lnSpc>
+              <a:spcBef>
+                <a:spcPts val="375"/>
+              </a:spcBef>
+              <a:buFont typeface="Arial"/>
+              <a:buNone/>
+              <a:defRPr sz="750" kern="1200">
+                <a:solidFill>
+                  <a:schemeClr val="tx1"/>
+                </a:solidFill>
+                <a:latin typeface="+mn-lt"/>
+                <a:ea typeface="+mn-ea"/>
+                <a:cs typeface="+mn-cs"/>
+              </a:defRPr>
+            </a:lvl5pPr>
+            <a:lvl6pPr marL="1714500" indent="0" algn="l" defTabSz="685800" rtl="0" eaLnBrk="1" latinLnBrk="0" hangingPunct="1">
+              <a:lnSpc>
+                <a:spcPct val="90000"/>
+              </a:lnSpc>
+              <a:spcBef>
+                <a:spcPts val="375"/>
+              </a:spcBef>
+              <a:buFont typeface="Arial"/>
+              <a:buNone/>
+              <a:defRPr sz="750" kern="1200">
+                <a:solidFill>
+                  <a:schemeClr val="tx1"/>
+                </a:solidFill>
+                <a:latin typeface="+mn-lt"/>
+                <a:ea typeface="+mn-ea"/>
+                <a:cs typeface="+mn-cs"/>
+              </a:defRPr>
+            </a:lvl6pPr>
+            <a:lvl7pPr marL="2057400" indent="0" algn="l" defTabSz="685800" rtl="0" eaLnBrk="1" latinLnBrk="0" hangingPunct="1">
+              <a:lnSpc>
+                <a:spcPct val="90000"/>
+              </a:lnSpc>
+              <a:spcBef>
+                <a:spcPts val="375"/>
+              </a:spcBef>
+              <a:buFont typeface="Arial"/>
+              <a:buNone/>
+              <a:defRPr sz="750" kern="1200">
+                <a:solidFill>
+                  <a:schemeClr val="tx1"/>
+                </a:solidFill>
+                <a:latin typeface="+mn-lt"/>
+                <a:ea typeface="+mn-ea"/>
+                <a:cs typeface="+mn-cs"/>
+              </a:defRPr>
+            </a:lvl7pPr>
+            <a:lvl8pPr marL="2400300" indent="0" algn="l" defTabSz="685800" rtl="0" eaLnBrk="1" latinLnBrk="0" hangingPunct="1">
+              <a:lnSpc>
+                <a:spcPct val="90000"/>
+              </a:lnSpc>
+              <a:spcBef>
+                <a:spcPts val="375"/>
+              </a:spcBef>
+              <a:buFont typeface="Arial"/>
+              <a:buNone/>
+              <a:defRPr sz="750" kern="1200">
+                <a:solidFill>
+                  <a:schemeClr val="tx1"/>
+                </a:solidFill>
+                <a:latin typeface="+mn-lt"/>
+                <a:ea typeface="+mn-ea"/>
+                <a:cs typeface="+mn-cs"/>
+              </a:defRPr>
+            </a:lvl8pPr>
+            <a:lvl9pPr marL="2743200" indent="0" algn="l" defTabSz="685800" rtl="0" eaLnBrk="1" latinLnBrk="0" hangingPunct="1">
+              <a:lnSpc>
+                <a:spcPct val="90000"/>
+              </a:lnSpc>
+              <a:spcBef>
+                <a:spcPts val="375"/>
+              </a:spcBef>
+              <a:buFont typeface="Arial"/>
+              <a:buNone/>
+              <a:defRPr sz="750" kern="1200">
+                <a:solidFill>
+                  <a:schemeClr val="tx1"/>
+                </a:solidFill>
+                <a:latin typeface="+mn-lt"/>
+                <a:ea typeface="+mn-ea"/>
+                <a:cs typeface="+mn-cs"/>
+              </a:defRPr>
+            </a:lvl9pPr>
+          </a:lstStyle>
+          <a:p>
+            <a:r>
+              <a:rPr lang="en-GB" sz="2400" dirty="0" smtClean="0"/>
+              <a:t>After the first deformation step the connection has become rigid</a:t>
+            </a:r>
+          </a:p>
+          <a:p>
+            <a:endParaRPr lang="en-GB" sz="2400" dirty="0"/>
+          </a:p>
+          <a:p>
+            <a:r>
+              <a:rPr lang="en-GB" sz="2400" dirty="0" smtClean="0"/>
+              <a:t>What is the next deformation step?</a:t>
+            </a:r>
+          </a:p>
+        </p:txBody>
+      </p:sp>
+      <p:sp>
+        <p:nvSpPr>
+          <p:cNvPr id="21" name="text2a" hidden="1"/>
+          <p:cNvSpPr txBox="1">
+            <a:spLocks/>
+          </p:cNvSpPr>
+          <p:nvPr/>
+        </p:nvSpPr>
+        <p:spPr>
+          <a:xfrm>
+            <a:off x="629841" y="2057400"/>
+            <a:ext cx="2949178" cy="3811588"/>
+          </a:xfrm>
+          <a:prstGeom prst="rect">
+            <a:avLst/>
+          </a:prstGeom>
+        </p:spPr>
+        <p:txBody>
+          <a:bodyPr vert="horz" lIns="91440" tIns="45720" rIns="91440" bIns="45720" rtlCol="0">
+            <a:normAutofit/>
+          </a:bodyPr>
+          <a:lstStyle>
+            <a:lvl1pPr marL="0" indent="0" algn="l" defTabSz="685800" rtl="0" eaLnBrk="1" latinLnBrk="0" hangingPunct="1">
+              <a:lnSpc>
+                <a:spcPct val="90000"/>
+              </a:lnSpc>
+              <a:spcBef>
+                <a:spcPts val="750"/>
+              </a:spcBef>
+              <a:buFont typeface="Arial"/>
+              <a:buNone/>
+              <a:defRPr sz="1200" kern="1200">
+                <a:solidFill>
+                  <a:schemeClr val="tx1"/>
+                </a:solidFill>
+                <a:latin typeface="+mn-lt"/>
+                <a:ea typeface="+mn-ea"/>
+                <a:cs typeface="+mn-cs"/>
+              </a:defRPr>
+            </a:lvl1pPr>
+            <a:lvl2pPr marL="342900" indent="0" algn="l" defTabSz="685800" rtl="0" eaLnBrk="1" latinLnBrk="0" hangingPunct="1">
+              <a:lnSpc>
+                <a:spcPct val="90000"/>
+              </a:lnSpc>
+              <a:spcBef>
+                <a:spcPts val="375"/>
+              </a:spcBef>
+              <a:buFont typeface="Arial"/>
+              <a:buNone/>
+              <a:defRPr sz="1050" kern="1200">
+                <a:solidFill>
+                  <a:schemeClr val="tx1"/>
+                </a:solidFill>
+                <a:latin typeface="+mn-lt"/>
+                <a:ea typeface="+mn-ea"/>
+                <a:cs typeface="+mn-cs"/>
+              </a:defRPr>
+            </a:lvl2pPr>
+            <a:lvl3pPr marL="685800" indent="0" algn="l" defTabSz="685800" rtl="0" eaLnBrk="1" latinLnBrk="0" hangingPunct="1">
+              <a:lnSpc>
+                <a:spcPct val="90000"/>
+              </a:lnSpc>
+              <a:spcBef>
+                <a:spcPts val="375"/>
+              </a:spcBef>
+              <a:buFont typeface="Arial"/>
+              <a:buNone/>
+              <a:defRPr sz="900" kern="1200">
+                <a:solidFill>
+                  <a:schemeClr val="tx1"/>
+                </a:solidFill>
+                <a:latin typeface="+mn-lt"/>
+                <a:ea typeface="+mn-ea"/>
+                <a:cs typeface="+mn-cs"/>
+              </a:defRPr>
+            </a:lvl3pPr>
+            <a:lvl4pPr marL="1028700" indent="0" algn="l" defTabSz="685800" rtl="0" eaLnBrk="1" latinLnBrk="0" hangingPunct="1">
+              <a:lnSpc>
+                <a:spcPct val="90000"/>
+              </a:lnSpc>
+              <a:spcBef>
+                <a:spcPts val="375"/>
+              </a:spcBef>
+              <a:buFont typeface="Arial"/>
+              <a:buNone/>
+              <a:defRPr sz="750" kern="1200">
+                <a:solidFill>
+                  <a:schemeClr val="tx1"/>
+                </a:solidFill>
+                <a:latin typeface="+mn-lt"/>
+                <a:ea typeface="+mn-ea"/>
+                <a:cs typeface="+mn-cs"/>
+              </a:defRPr>
+            </a:lvl4pPr>
+            <a:lvl5pPr marL="1371600" indent="0" algn="l" defTabSz="685800" rtl="0" eaLnBrk="1" latinLnBrk="0" hangingPunct="1">
+              <a:lnSpc>
+                <a:spcPct val="90000"/>
+              </a:lnSpc>
+              <a:spcBef>
+                <a:spcPts val="375"/>
+              </a:spcBef>
+              <a:buFont typeface="Arial"/>
+              <a:buNone/>
+              <a:defRPr sz="750" kern="1200">
+                <a:solidFill>
+                  <a:schemeClr val="tx1"/>
+                </a:solidFill>
+                <a:latin typeface="+mn-lt"/>
+                <a:ea typeface="+mn-ea"/>
+                <a:cs typeface="+mn-cs"/>
+              </a:defRPr>
+            </a:lvl5pPr>
+            <a:lvl6pPr marL="1714500" indent="0" algn="l" defTabSz="685800" rtl="0" eaLnBrk="1" latinLnBrk="0" hangingPunct="1">
+              <a:lnSpc>
+                <a:spcPct val="90000"/>
+              </a:lnSpc>
+              <a:spcBef>
+                <a:spcPts val="375"/>
+              </a:spcBef>
+              <a:buFont typeface="Arial"/>
+              <a:buNone/>
+              <a:defRPr sz="750" kern="1200">
+                <a:solidFill>
+                  <a:schemeClr val="tx1"/>
+                </a:solidFill>
+                <a:latin typeface="+mn-lt"/>
+                <a:ea typeface="+mn-ea"/>
+                <a:cs typeface="+mn-cs"/>
+              </a:defRPr>
+            </a:lvl6pPr>
+            <a:lvl7pPr marL="2057400" indent="0" algn="l" defTabSz="685800" rtl="0" eaLnBrk="1" latinLnBrk="0" hangingPunct="1">
+              <a:lnSpc>
+                <a:spcPct val="90000"/>
+              </a:lnSpc>
+              <a:spcBef>
+                <a:spcPts val="375"/>
+              </a:spcBef>
+              <a:buFont typeface="Arial"/>
+              <a:buNone/>
+              <a:defRPr sz="750" kern="1200">
+                <a:solidFill>
+                  <a:schemeClr val="tx1"/>
+                </a:solidFill>
+                <a:latin typeface="+mn-lt"/>
+                <a:ea typeface="+mn-ea"/>
+                <a:cs typeface="+mn-cs"/>
+              </a:defRPr>
+            </a:lvl7pPr>
+            <a:lvl8pPr marL="2400300" indent="0" algn="l" defTabSz="685800" rtl="0" eaLnBrk="1" latinLnBrk="0" hangingPunct="1">
+              <a:lnSpc>
+                <a:spcPct val="90000"/>
+              </a:lnSpc>
+              <a:spcBef>
+                <a:spcPts val="375"/>
+              </a:spcBef>
+              <a:buFont typeface="Arial"/>
+              <a:buNone/>
+              <a:defRPr sz="750" kern="1200">
+                <a:solidFill>
+                  <a:schemeClr val="tx1"/>
+                </a:solidFill>
+                <a:latin typeface="+mn-lt"/>
+                <a:ea typeface="+mn-ea"/>
+                <a:cs typeface="+mn-cs"/>
+              </a:defRPr>
+            </a:lvl8pPr>
+            <a:lvl9pPr marL="2743200" indent="0" algn="l" defTabSz="685800" rtl="0" eaLnBrk="1" latinLnBrk="0" hangingPunct="1">
+              <a:lnSpc>
+                <a:spcPct val="90000"/>
+              </a:lnSpc>
+              <a:spcBef>
+                <a:spcPts val="375"/>
+              </a:spcBef>
+              <a:buFont typeface="Arial"/>
+              <a:buNone/>
+              <a:defRPr sz="750" kern="1200">
+                <a:solidFill>
+                  <a:schemeClr val="tx1"/>
+                </a:solidFill>
+                <a:latin typeface="+mn-lt"/>
+                <a:ea typeface="+mn-ea"/>
+                <a:cs typeface="+mn-cs"/>
+              </a:defRPr>
+            </a:lvl9pPr>
+          </a:lstStyle>
+          <a:p>
+            <a:r>
+              <a:rPr lang="en-GB" sz="2400" dirty="0" smtClean="0"/>
+              <a:t>If we keep on deforming the same members, the rigid connection </a:t>
+            </a:r>
+            <a:r>
+              <a:rPr lang="en-GB" sz="2400" smtClean="0"/>
+              <a:t>is deformed</a:t>
+            </a:r>
+            <a:endParaRPr lang="en-GB" sz="2400" dirty="0" smtClean="0"/>
+          </a:p>
+        </p:txBody>
+      </p:sp>
+      <p:sp>
+        <p:nvSpPr>
+          <p:cNvPr id="22" name="text2b" hidden="1"/>
+          <p:cNvSpPr txBox="1">
+            <a:spLocks/>
+          </p:cNvSpPr>
+          <p:nvPr/>
+        </p:nvSpPr>
+        <p:spPr>
+          <a:xfrm>
+            <a:off x="628649" y="2057400"/>
+            <a:ext cx="2949178" cy="3811588"/>
+          </a:xfrm>
+          <a:prstGeom prst="rect">
+            <a:avLst/>
+          </a:prstGeom>
+        </p:spPr>
+        <p:txBody>
+          <a:bodyPr vert="horz" lIns="91440" tIns="45720" rIns="91440" bIns="45720" rtlCol="0">
+            <a:normAutofit/>
+          </a:bodyPr>
+          <a:lstStyle>
+            <a:lvl1pPr marL="0" indent="0" algn="l" defTabSz="685800" rtl="0" eaLnBrk="1" latinLnBrk="0" hangingPunct="1">
+              <a:lnSpc>
+                <a:spcPct val="90000"/>
+              </a:lnSpc>
+              <a:spcBef>
+                <a:spcPts val="750"/>
+              </a:spcBef>
+              <a:buFont typeface="Arial"/>
+              <a:buNone/>
+              <a:defRPr sz="1200" kern="1200">
+                <a:solidFill>
+                  <a:schemeClr val="tx1"/>
+                </a:solidFill>
+                <a:latin typeface="+mn-lt"/>
+                <a:ea typeface="+mn-ea"/>
+                <a:cs typeface="+mn-cs"/>
+              </a:defRPr>
+            </a:lvl1pPr>
+            <a:lvl2pPr marL="342900" indent="0" algn="l" defTabSz="685800" rtl="0" eaLnBrk="1" latinLnBrk="0" hangingPunct="1">
+              <a:lnSpc>
+                <a:spcPct val="90000"/>
+              </a:lnSpc>
+              <a:spcBef>
+                <a:spcPts val="375"/>
+              </a:spcBef>
+              <a:buFont typeface="Arial"/>
+              <a:buNone/>
+              <a:defRPr sz="1050" kern="1200">
+                <a:solidFill>
+                  <a:schemeClr val="tx1"/>
+                </a:solidFill>
+                <a:latin typeface="+mn-lt"/>
+                <a:ea typeface="+mn-ea"/>
+                <a:cs typeface="+mn-cs"/>
+              </a:defRPr>
+            </a:lvl2pPr>
+            <a:lvl3pPr marL="685800" indent="0" algn="l" defTabSz="685800" rtl="0" eaLnBrk="1" latinLnBrk="0" hangingPunct="1">
+              <a:lnSpc>
+                <a:spcPct val="90000"/>
+              </a:lnSpc>
+              <a:spcBef>
+                <a:spcPts val="375"/>
+              </a:spcBef>
+              <a:buFont typeface="Arial"/>
+              <a:buNone/>
+              <a:defRPr sz="900" kern="1200">
+                <a:solidFill>
+                  <a:schemeClr val="tx1"/>
+                </a:solidFill>
+                <a:latin typeface="+mn-lt"/>
+                <a:ea typeface="+mn-ea"/>
+                <a:cs typeface="+mn-cs"/>
+              </a:defRPr>
+            </a:lvl3pPr>
+            <a:lvl4pPr marL="1028700" indent="0" algn="l" defTabSz="685800" rtl="0" eaLnBrk="1" latinLnBrk="0" hangingPunct="1">
+              <a:lnSpc>
+                <a:spcPct val="90000"/>
+              </a:lnSpc>
+              <a:spcBef>
+                <a:spcPts val="375"/>
+              </a:spcBef>
+              <a:buFont typeface="Arial"/>
+              <a:buNone/>
+              <a:defRPr sz="750" kern="1200">
+                <a:solidFill>
+                  <a:schemeClr val="tx1"/>
+                </a:solidFill>
+                <a:latin typeface="+mn-lt"/>
+                <a:ea typeface="+mn-ea"/>
+                <a:cs typeface="+mn-cs"/>
+              </a:defRPr>
+            </a:lvl4pPr>
+            <a:lvl5pPr marL="1371600" indent="0" algn="l" defTabSz="685800" rtl="0" eaLnBrk="1" latinLnBrk="0" hangingPunct="1">
+              <a:lnSpc>
+                <a:spcPct val="90000"/>
+              </a:lnSpc>
+              <a:spcBef>
+                <a:spcPts val="375"/>
+              </a:spcBef>
+              <a:buFont typeface="Arial"/>
+              <a:buNone/>
+              <a:defRPr sz="750" kern="1200">
+                <a:solidFill>
+                  <a:schemeClr val="tx1"/>
+                </a:solidFill>
+                <a:latin typeface="+mn-lt"/>
+                <a:ea typeface="+mn-ea"/>
+                <a:cs typeface="+mn-cs"/>
+              </a:defRPr>
+            </a:lvl5pPr>
+            <a:lvl6pPr marL="1714500" indent="0" algn="l" defTabSz="685800" rtl="0" eaLnBrk="1" latinLnBrk="0" hangingPunct="1">
+              <a:lnSpc>
+                <a:spcPct val="90000"/>
+              </a:lnSpc>
+              <a:spcBef>
+                <a:spcPts val="375"/>
+              </a:spcBef>
+              <a:buFont typeface="Arial"/>
+              <a:buNone/>
+              <a:defRPr sz="750" kern="1200">
+                <a:solidFill>
+                  <a:schemeClr val="tx1"/>
+                </a:solidFill>
+                <a:latin typeface="+mn-lt"/>
+                <a:ea typeface="+mn-ea"/>
+                <a:cs typeface="+mn-cs"/>
+              </a:defRPr>
+            </a:lvl6pPr>
+            <a:lvl7pPr marL="2057400" indent="0" algn="l" defTabSz="685800" rtl="0" eaLnBrk="1" latinLnBrk="0" hangingPunct="1">
+              <a:lnSpc>
+                <a:spcPct val="90000"/>
+              </a:lnSpc>
+              <a:spcBef>
+                <a:spcPts val="375"/>
+              </a:spcBef>
+              <a:buFont typeface="Arial"/>
+              <a:buNone/>
+              <a:defRPr sz="750" kern="1200">
+                <a:solidFill>
+                  <a:schemeClr val="tx1"/>
+                </a:solidFill>
+                <a:latin typeface="+mn-lt"/>
+                <a:ea typeface="+mn-ea"/>
+                <a:cs typeface="+mn-cs"/>
+              </a:defRPr>
+            </a:lvl7pPr>
+            <a:lvl8pPr marL="2400300" indent="0" algn="l" defTabSz="685800" rtl="0" eaLnBrk="1" latinLnBrk="0" hangingPunct="1">
+              <a:lnSpc>
+                <a:spcPct val="90000"/>
+              </a:lnSpc>
+              <a:spcBef>
+                <a:spcPts val="375"/>
+              </a:spcBef>
+              <a:buFont typeface="Arial"/>
+              <a:buNone/>
+              <a:defRPr sz="750" kern="1200">
+                <a:solidFill>
+                  <a:schemeClr val="tx1"/>
+                </a:solidFill>
+                <a:latin typeface="+mn-lt"/>
+                <a:ea typeface="+mn-ea"/>
+                <a:cs typeface="+mn-cs"/>
+              </a:defRPr>
+            </a:lvl8pPr>
+            <a:lvl9pPr marL="2743200" indent="0" algn="l" defTabSz="685800" rtl="0" eaLnBrk="1" latinLnBrk="0" hangingPunct="1">
+              <a:lnSpc>
+                <a:spcPct val="90000"/>
+              </a:lnSpc>
+              <a:spcBef>
+                <a:spcPts val="375"/>
+              </a:spcBef>
+              <a:buFont typeface="Arial"/>
+              <a:buNone/>
+              <a:defRPr sz="750" kern="1200">
+                <a:solidFill>
+                  <a:schemeClr val="tx1"/>
+                </a:solidFill>
+                <a:latin typeface="+mn-lt"/>
+                <a:ea typeface="+mn-ea"/>
+                <a:cs typeface="+mn-cs"/>
+              </a:defRPr>
+            </a:lvl9pPr>
+          </a:lstStyle>
+          <a:p>
+            <a:r>
+              <a:rPr lang="en-GB" sz="2400" dirty="0" smtClean="0"/>
+              <a:t>If we stop deforming the bottom right member and deform the members on the left, we obtain the following structure, which is </a:t>
+            </a:r>
+            <a:r>
+              <a:rPr lang="en-GB" sz="2400" smtClean="0"/>
+              <a:t>completely deformed</a:t>
+            </a:r>
+          </a:p>
+        </p:txBody>
+      </p:sp>
     </p:spTree>
     <p:extLst>
       <p:ext uri="{BB962C8B-B14F-4D97-AF65-F5344CB8AC3E}">
@@ -7932,9 +9414,1084 @@
   <p:timing>
     <p:tnLst>
       <p:par>
-        <p:cTn id="1" dur="indefinite" restart="never" nodeType="tmRoot"/>
+        <p:cTn id="1" dur="indefinite" restart="never" nodeType="tmRoot">
+          <p:childTnLst>
+            <p:seq concurrent="1" nextAc="seek">
+              <p:cTn id="2" dur="indefinite" nodeType="mainSeq">
+                <p:childTnLst>
+                  <p:par>
+                    <p:cTn id="3" fill="hold">
+                      <p:stCondLst>
+                        <p:cond delay="indefinite"/>
+                      </p:stCondLst>
+                      <p:childTnLst>
+                        <p:par>
+                          <p:cTn id="4" fill="hold">
+                            <p:stCondLst>
+                              <p:cond delay="0"/>
+                            </p:stCondLst>
+                            <p:childTnLst>
+                              <p:par>
+                                <p:cTn id="5" presetID="1" presetClass="entr" presetSubtype="0" fill="hold" nodeType="clickEffect">
+                                  <p:stCondLst>
+                                    <p:cond delay="0"/>
+                                  </p:stCondLst>
+                                  <p:childTnLst>
+                                    <p:set>
+                                      <p:cBhvr>
+                                        <p:cTn id="6" dur="1" fill="hold">
+                                          <p:stCondLst>
+                                            <p:cond delay="0"/>
+                                          </p:stCondLst>
+                                        </p:cTn>
+                                        <p:tgtEl>
+                                          <p:spTgt spid="7"/>
+                                        </p:tgtEl>
+                                        <p:attrNameLst>
+                                          <p:attrName>style.visibility</p:attrName>
+                                        </p:attrNameLst>
+                                      </p:cBhvr>
+                                      <p:to>
+                                        <p:strVal val="visible"/>
+                                      </p:to>
+                                    </p:set>
+                                  </p:childTnLst>
+                                </p:cTn>
+                              </p:par>
+                              <p:par>
+                                <p:cTn id="7" presetID="1" presetClass="entr" presetSubtype="0" fill="hold" grpId="1" nodeType="withEffect">
+                                  <p:stCondLst>
+                                    <p:cond delay="0"/>
+                                  </p:stCondLst>
+                                  <p:childTnLst>
+                                    <p:set>
+                                      <p:cBhvr>
+                                        <p:cTn id="8" dur="1" fill="hold">
+                                          <p:stCondLst>
+                                            <p:cond delay="0"/>
+                                          </p:stCondLst>
+                                        </p:cTn>
+                                        <p:tgtEl>
+                                          <p:spTgt spid="9">
+                                            <p:txEl>
+                                              <p:pRg st="2" end="2"/>
+                                            </p:txEl>
+                                          </p:spTgt>
+                                        </p:tgtEl>
+                                        <p:attrNameLst>
+                                          <p:attrName>style.visibility</p:attrName>
+                                        </p:attrNameLst>
+                                      </p:cBhvr>
+                                      <p:to>
+                                        <p:strVal val="visible"/>
+                                      </p:to>
+                                    </p:set>
+                                  </p:childTnLst>
+                                </p:cTn>
+                              </p:par>
+                            </p:childTnLst>
+                          </p:cTn>
+                        </p:par>
+                      </p:childTnLst>
+                    </p:cTn>
+                  </p:par>
+                  <p:par>
+                    <p:cTn id="9" fill="hold">
+                      <p:stCondLst>
+                        <p:cond delay="indefinite"/>
+                      </p:stCondLst>
+                      <p:childTnLst>
+                        <p:par>
+                          <p:cTn id="10" fill="hold">
+                            <p:stCondLst>
+                              <p:cond delay="0"/>
+                            </p:stCondLst>
+                            <p:childTnLst>
+                              <p:par>
+                                <p:cTn id="11" presetID="1" presetClass="exit" presetSubtype="0" fill="hold" grpId="0" nodeType="clickEffect">
+                                  <p:stCondLst>
+                                    <p:cond delay="0"/>
+                                  </p:stCondLst>
+                                  <p:childTnLst>
+                                    <p:set>
+                                      <p:cBhvr>
+                                        <p:cTn id="12" dur="1" fill="hold">
+                                          <p:stCondLst>
+                                            <p:cond delay="0"/>
+                                          </p:stCondLst>
+                                        </p:cTn>
+                                        <p:tgtEl>
+                                          <p:spTgt spid="9">
+                                            <p:txEl>
+                                              <p:pRg st="0" end="0"/>
+                                            </p:txEl>
+                                          </p:spTgt>
+                                        </p:tgtEl>
+                                        <p:attrNameLst>
+                                          <p:attrName>style.visibility</p:attrName>
+                                        </p:attrNameLst>
+                                      </p:cBhvr>
+                                      <p:to>
+                                        <p:strVal val="hidden"/>
+                                      </p:to>
+                                    </p:set>
+                                  </p:childTnLst>
+                                </p:cTn>
+                              </p:par>
+                              <p:par>
+                                <p:cTn id="13" presetID="1" presetClass="exit" presetSubtype="0" fill="hold" grpId="0" nodeType="withEffect">
+                                  <p:stCondLst>
+                                    <p:cond delay="0"/>
+                                  </p:stCondLst>
+                                  <p:childTnLst>
+                                    <p:set>
+                                      <p:cBhvr>
+                                        <p:cTn id="14" dur="1" fill="hold">
+                                          <p:stCondLst>
+                                            <p:cond delay="0"/>
+                                          </p:stCondLst>
+                                        </p:cTn>
+                                        <p:tgtEl>
+                                          <p:spTgt spid="9">
+                                            <p:txEl>
+                                              <p:pRg st="2" end="2"/>
+                                            </p:txEl>
+                                          </p:spTgt>
+                                        </p:tgtEl>
+                                        <p:attrNameLst>
+                                          <p:attrName>style.visibility</p:attrName>
+                                        </p:attrNameLst>
+                                      </p:cBhvr>
+                                      <p:to>
+                                        <p:strVal val="hidden"/>
+                                      </p:to>
+                                    </p:set>
+                                  </p:childTnLst>
+                                </p:cTn>
+                              </p:par>
+                              <p:par>
+                                <p:cTn id="15" presetID="12" presetClass="exit" presetSubtype="8" fill="hold" nodeType="withEffect">
+                                  <p:stCondLst>
+                                    <p:cond delay="0"/>
+                                  </p:stCondLst>
+                                  <p:childTnLst>
+                                    <p:anim calcmode="lin" valueType="num">
+                                      <p:cBhvr additive="base">
+                                        <p:cTn id="16" dur="500"/>
+                                        <p:tgtEl>
+                                          <p:spTgt spid="7"/>
+                                        </p:tgtEl>
+                                        <p:attrNameLst>
+                                          <p:attrName>ppt_x</p:attrName>
+                                        </p:attrNameLst>
+                                      </p:cBhvr>
+                                      <p:tavLst>
+                                        <p:tav tm="0">
+                                          <p:val>
+                                            <p:strVal val="#ppt_x"/>
+                                          </p:val>
+                                        </p:tav>
+                                        <p:tav tm="100000">
+                                          <p:val>
+                                            <p:strVal val="#ppt_x-#ppt_w*1.125000"/>
+                                          </p:val>
+                                        </p:tav>
+                                      </p:tavLst>
+                                    </p:anim>
+                                    <p:animEffect transition="out" filter="wipe(left)">
+                                      <p:cBhvr>
+                                        <p:cTn id="17" dur="500"/>
+                                        <p:tgtEl>
+                                          <p:spTgt spid="7"/>
+                                        </p:tgtEl>
+                                      </p:cBhvr>
+                                    </p:animEffect>
+                                    <p:set>
+                                      <p:cBhvr>
+                                        <p:cTn id="18" dur="1" fill="hold">
+                                          <p:stCondLst>
+                                            <p:cond delay="499"/>
+                                          </p:stCondLst>
+                                        </p:cTn>
+                                        <p:tgtEl>
+                                          <p:spTgt spid="7"/>
+                                        </p:tgtEl>
+                                        <p:attrNameLst>
+                                          <p:attrName>style.visibility</p:attrName>
+                                        </p:attrNameLst>
+                                      </p:cBhvr>
+                                      <p:to>
+                                        <p:strVal val="hidden"/>
+                                      </p:to>
+                                    </p:set>
+                                  </p:childTnLst>
+                                </p:cTn>
+                              </p:par>
+                              <p:par>
+                                <p:cTn id="19" presetID="1" presetClass="entr" presetSubtype="0" fill="hold" nodeType="withEffect">
+                                  <p:stCondLst>
+                                    <p:cond delay="200"/>
+                                  </p:stCondLst>
+                                  <p:childTnLst>
+                                    <p:set>
+                                      <p:cBhvr>
+                                        <p:cTn id="20" dur="1" fill="hold">
+                                          <p:stCondLst>
+                                            <p:cond delay="0"/>
+                                          </p:stCondLst>
+                                        </p:cTn>
+                                        <p:tgtEl>
+                                          <p:spTgt spid="10"/>
+                                        </p:tgtEl>
+                                        <p:attrNameLst>
+                                          <p:attrName>style.visibility</p:attrName>
+                                        </p:attrNameLst>
+                                      </p:cBhvr>
+                                      <p:to>
+                                        <p:strVal val="visible"/>
+                                      </p:to>
+                                    </p:set>
+                                  </p:childTnLst>
+                                </p:cTn>
+                              </p:par>
+                              <p:par>
+                                <p:cTn id="21" presetID="1" presetClass="exit" presetSubtype="0" fill="hold" nodeType="withEffect">
+                                  <p:stCondLst>
+                                    <p:cond delay="200"/>
+                                  </p:stCondLst>
+                                  <p:childTnLst>
+                                    <p:set>
+                                      <p:cBhvr>
+                                        <p:cTn id="22" dur="1" fill="hold">
+                                          <p:stCondLst>
+                                            <p:cond delay="0"/>
+                                          </p:stCondLst>
+                                        </p:cTn>
+                                        <p:tgtEl>
+                                          <p:spTgt spid="7"/>
+                                        </p:tgtEl>
+                                        <p:attrNameLst>
+                                          <p:attrName>style.visibility</p:attrName>
+                                        </p:attrNameLst>
+                                      </p:cBhvr>
+                                      <p:to>
+                                        <p:strVal val="hidden"/>
+                                      </p:to>
+                                    </p:set>
+                                  </p:childTnLst>
+                                </p:cTn>
+                              </p:par>
+                              <p:par>
+                                <p:cTn id="23" presetID="1" presetClass="entr" presetSubtype="0" fill="hold" grpId="0" nodeType="withEffect">
+                                  <p:stCondLst>
+                                    <p:cond delay="0"/>
+                                  </p:stCondLst>
+                                  <p:childTnLst>
+                                    <p:set>
+                                      <p:cBhvr>
+                                        <p:cTn id="24" dur="1" fill="hold">
+                                          <p:stCondLst>
+                                            <p:cond delay="0"/>
+                                          </p:stCondLst>
+                                        </p:cTn>
+                                        <p:tgtEl>
+                                          <p:spTgt spid="20"/>
+                                        </p:tgtEl>
+                                        <p:attrNameLst>
+                                          <p:attrName>style.visibility</p:attrName>
+                                        </p:attrNameLst>
+                                      </p:cBhvr>
+                                      <p:to>
+                                        <p:strVal val="visible"/>
+                                      </p:to>
+                                    </p:set>
+                                  </p:childTnLst>
+                                </p:cTn>
+                              </p:par>
+                            </p:childTnLst>
+                          </p:cTn>
+                        </p:par>
+                      </p:childTnLst>
+                    </p:cTn>
+                  </p:par>
+                  <p:par>
+                    <p:cTn id="25" fill="hold">
+                      <p:stCondLst>
+                        <p:cond delay="indefinite"/>
+                      </p:stCondLst>
+                      <p:childTnLst>
+                        <p:par>
+                          <p:cTn id="26" fill="hold">
+                            <p:stCondLst>
+                              <p:cond delay="0"/>
+                            </p:stCondLst>
+                            <p:childTnLst>
+                              <p:par>
+                                <p:cTn id="27" presetID="1" presetClass="entr" presetSubtype="0" fill="hold" nodeType="clickEffect">
+                                  <p:stCondLst>
+                                    <p:cond delay="0"/>
+                                  </p:stCondLst>
+                                  <p:childTnLst>
+                                    <p:set>
+                                      <p:cBhvr>
+                                        <p:cTn id="28" dur="1" fill="hold">
+                                          <p:stCondLst>
+                                            <p:cond delay="0"/>
+                                          </p:stCondLst>
+                                        </p:cTn>
+                                        <p:tgtEl>
+                                          <p:spTgt spid="11"/>
+                                        </p:tgtEl>
+                                        <p:attrNameLst>
+                                          <p:attrName>style.visibility</p:attrName>
+                                        </p:attrNameLst>
+                                      </p:cBhvr>
+                                      <p:to>
+                                        <p:strVal val="visible"/>
+                                      </p:to>
+                                    </p:set>
+                                  </p:childTnLst>
+                                </p:cTn>
+                              </p:par>
+                              <p:par>
+                                <p:cTn id="29" presetID="1" presetClass="entr" presetSubtype="0" fill="hold" grpId="1" nodeType="withEffect">
+                                  <p:stCondLst>
+                                    <p:cond delay="0"/>
+                                  </p:stCondLst>
+                                  <p:childTnLst>
+                                    <p:set>
+                                      <p:cBhvr>
+                                        <p:cTn id="30" dur="1" fill="hold">
+                                          <p:stCondLst>
+                                            <p:cond delay="0"/>
+                                          </p:stCondLst>
+                                        </p:cTn>
+                                        <p:tgtEl>
+                                          <p:spTgt spid="21"/>
+                                        </p:tgtEl>
+                                        <p:attrNameLst>
+                                          <p:attrName>style.visibility</p:attrName>
+                                        </p:attrNameLst>
+                                      </p:cBhvr>
+                                      <p:to>
+                                        <p:strVal val="visible"/>
+                                      </p:to>
+                                    </p:set>
+                                  </p:childTnLst>
+                                </p:cTn>
+                              </p:par>
+                              <p:par>
+                                <p:cTn id="31" presetID="1" presetClass="exit" presetSubtype="0" fill="hold" grpId="1" nodeType="withEffect">
+                                  <p:stCondLst>
+                                    <p:cond delay="0"/>
+                                  </p:stCondLst>
+                                  <p:childTnLst>
+                                    <p:set>
+                                      <p:cBhvr>
+                                        <p:cTn id="32" dur="1" fill="hold">
+                                          <p:stCondLst>
+                                            <p:cond delay="0"/>
+                                          </p:stCondLst>
+                                        </p:cTn>
+                                        <p:tgtEl>
+                                          <p:spTgt spid="20"/>
+                                        </p:tgtEl>
+                                        <p:attrNameLst>
+                                          <p:attrName>style.visibility</p:attrName>
+                                        </p:attrNameLst>
+                                      </p:cBhvr>
+                                      <p:to>
+                                        <p:strVal val="hidden"/>
+                                      </p:to>
+                                    </p:set>
+                                  </p:childTnLst>
+                                </p:cTn>
+                              </p:par>
+                            </p:childTnLst>
+                          </p:cTn>
+                        </p:par>
+                      </p:childTnLst>
+                    </p:cTn>
+                  </p:par>
+                  <p:par>
+                    <p:cTn id="33" fill="hold">
+                      <p:stCondLst>
+                        <p:cond delay="indefinite"/>
+                      </p:stCondLst>
+                      <p:childTnLst>
+                        <p:par>
+                          <p:cTn id="34" fill="hold">
+                            <p:stCondLst>
+                              <p:cond delay="0"/>
+                            </p:stCondLst>
+                            <p:childTnLst>
+                              <p:par>
+                                <p:cTn id="35" presetID="1" presetClass="exit" presetSubtype="0" fill="hold" nodeType="clickEffect">
+                                  <p:stCondLst>
+                                    <p:cond delay="0"/>
+                                  </p:stCondLst>
+                                  <p:childTnLst>
+                                    <p:set>
+                                      <p:cBhvr>
+                                        <p:cTn id="36" dur="1" fill="hold">
+                                          <p:stCondLst>
+                                            <p:cond delay="0"/>
+                                          </p:stCondLst>
+                                        </p:cTn>
+                                        <p:tgtEl>
+                                          <p:spTgt spid="11"/>
+                                        </p:tgtEl>
+                                        <p:attrNameLst>
+                                          <p:attrName>style.visibility</p:attrName>
+                                        </p:attrNameLst>
+                                      </p:cBhvr>
+                                      <p:to>
+                                        <p:strVal val="hidden"/>
+                                      </p:to>
+                                    </p:set>
+                                  </p:childTnLst>
+                                </p:cTn>
+                              </p:par>
+                              <p:par>
+                                <p:cTn id="37" presetID="1" presetClass="exit" presetSubtype="0" fill="hold" grpId="2" nodeType="withEffect">
+                                  <p:stCondLst>
+                                    <p:cond delay="0"/>
+                                  </p:stCondLst>
+                                  <p:childTnLst>
+                                    <p:set>
+                                      <p:cBhvr>
+                                        <p:cTn id="38" dur="1" fill="hold">
+                                          <p:stCondLst>
+                                            <p:cond delay="0"/>
+                                          </p:stCondLst>
+                                        </p:cTn>
+                                        <p:tgtEl>
+                                          <p:spTgt spid="21"/>
+                                        </p:tgtEl>
+                                        <p:attrNameLst>
+                                          <p:attrName>style.visibility</p:attrName>
+                                        </p:attrNameLst>
+                                      </p:cBhvr>
+                                      <p:to>
+                                        <p:strVal val="hidden"/>
+                                      </p:to>
+                                    </p:set>
+                                  </p:childTnLst>
+                                </p:cTn>
+                              </p:par>
+                            </p:childTnLst>
+                          </p:cTn>
+                        </p:par>
+                      </p:childTnLst>
+                    </p:cTn>
+                  </p:par>
+                  <p:par>
+                    <p:cTn id="39" fill="hold">
+                      <p:stCondLst>
+                        <p:cond delay="indefinite"/>
+                      </p:stCondLst>
+                      <p:childTnLst>
+                        <p:par>
+                          <p:cTn id="40" fill="hold">
+                            <p:stCondLst>
+                              <p:cond delay="0"/>
+                            </p:stCondLst>
+                            <p:childTnLst>
+                              <p:par>
+                                <p:cTn id="41" presetID="1" presetClass="entr" presetSubtype="0" fill="hold" nodeType="clickEffect">
+                                  <p:stCondLst>
+                                    <p:cond delay="0"/>
+                                  </p:stCondLst>
+                                  <p:childTnLst>
+                                    <p:set>
+                                      <p:cBhvr>
+                                        <p:cTn id="42" dur="1" fill="hold">
+                                          <p:stCondLst>
+                                            <p:cond delay="0"/>
+                                          </p:stCondLst>
+                                        </p:cTn>
+                                        <p:tgtEl>
+                                          <p:spTgt spid="12"/>
+                                        </p:tgtEl>
+                                        <p:attrNameLst>
+                                          <p:attrName>style.visibility</p:attrName>
+                                        </p:attrNameLst>
+                                      </p:cBhvr>
+                                      <p:to>
+                                        <p:strVal val="visible"/>
+                                      </p:to>
+                                    </p:set>
+                                  </p:childTnLst>
+                                </p:cTn>
+                              </p:par>
+                              <p:par>
+                                <p:cTn id="43" presetID="1" presetClass="entr" presetSubtype="0" fill="hold" grpId="0" nodeType="withEffect">
+                                  <p:stCondLst>
+                                    <p:cond delay="0"/>
+                                  </p:stCondLst>
+                                  <p:childTnLst>
+                                    <p:set>
+                                      <p:cBhvr>
+                                        <p:cTn id="44" dur="1" fill="hold">
+                                          <p:stCondLst>
+                                            <p:cond delay="0"/>
+                                          </p:stCondLst>
+                                        </p:cTn>
+                                        <p:tgtEl>
+                                          <p:spTgt spid="22"/>
+                                        </p:tgtEl>
+                                        <p:attrNameLst>
+                                          <p:attrName>style.visibility</p:attrName>
+                                        </p:attrNameLst>
+                                      </p:cBhvr>
+                                      <p:to>
+                                        <p:strVal val="visible"/>
+                                      </p:to>
+                                    </p:set>
+                                  </p:childTnLst>
+                                </p:cTn>
+                              </p:par>
+                            </p:childTnLst>
+                          </p:cTn>
+                        </p:par>
+                      </p:childTnLst>
+                    </p:cTn>
+                  </p:par>
+                  <p:par>
+                    <p:cTn id="45" fill="hold">
+                      <p:stCondLst>
+                        <p:cond delay="indefinite"/>
+                      </p:stCondLst>
+                      <p:childTnLst>
+                        <p:par>
+                          <p:cTn id="46" fill="hold">
+                            <p:stCondLst>
+                              <p:cond delay="0"/>
+                            </p:stCondLst>
+                            <p:childTnLst>
+                              <p:par>
+                                <p:cTn id="47" presetID="1" presetClass="exit" presetSubtype="0" fill="hold" nodeType="clickEffect">
+                                  <p:stCondLst>
+                                    <p:cond delay="0"/>
+                                  </p:stCondLst>
+                                  <p:childTnLst>
+                                    <p:set>
+                                      <p:cBhvr>
+                                        <p:cTn id="48" dur="1" fill="hold">
+                                          <p:stCondLst>
+                                            <p:cond delay="0"/>
+                                          </p:stCondLst>
+                                        </p:cTn>
+                                        <p:tgtEl>
+                                          <p:spTgt spid="12"/>
+                                        </p:tgtEl>
+                                        <p:attrNameLst>
+                                          <p:attrName>style.visibility</p:attrName>
+                                        </p:attrNameLst>
+                                      </p:cBhvr>
+                                      <p:to>
+                                        <p:strVal val="hidden"/>
+                                      </p:to>
+                                    </p:set>
+                                  </p:childTnLst>
+                                </p:cTn>
+                              </p:par>
+                              <p:par>
+                                <p:cTn id="49" presetID="1" presetClass="exit" presetSubtype="0" fill="hold" grpId="1" nodeType="withEffect">
+                                  <p:stCondLst>
+                                    <p:cond delay="0"/>
+                                  </p:stCondLst>
+                                  <p:childTnLst>
+                                    <p:set>
+                                      <p:cBhvr>
+                                        <p:cTn id="50" dur="1" fill="hold">
+                                          <p:stCondLst>
+                                            <p:cond delay="0"/>
+                                          </p:stCondLst>
+                                        </p:cTn>
+                                        <p:tgtEl>
+                                          <p:spTgt spid="22"/>
+                                        </p:tgtEl>
+                                        <p:attrNameLst>
+                                          <p:attrName>style.visibility</p:attrName>
+                                        </p:attrNameLst>
+                                      </p:cBhvr>
+                                      <p:to>
+                                        <p:strVal val="hidden"/>
+                                      </p:to>
+                                    </p:set>
+                                  </p:childTnLst>
+                                </p:cTn>
+                              </p:par>
+                            </p:childTnLst>
+                          </p:cTn>
+                        </p:par>
+                      </p:childTnLst>
+                    </p:cTn>
+                  </p:par>
+                  <p:par>
+                    <p:cTn id="51" fill="hold">
+                      <p:stCondLst>
+                        <p:cond delay="indefinite"/>
+                      </p:stCondLst>
+                      <p:childTnLst>
+                        <p:par>
+                          <p:cTn id="52" fill="hold">
+                            <p:stCondLst>
+                              <p:cond delay="0"/>
+                            </p:stCondLst>
+                            <p:childTnLst>
+                              <p:par>
+                                <p:cTn id="53" presetID="1" presetClass="entr" presetSubtype="0" fill="hold" nodeType="clickEffect">
+                                  <p:stCondLst>
+                                    <p:cond delay="0"/>
+                                  </p:stCondLst>
+                                  <p:childTnLst>
+                                    <p:set>
+                                      <p:cBhvr>
+                                        <p:cTn id="54" dur="1" fill="hold">
+                                          <p:stCondLst>
+                                            <p:cond delay="0"/>
+                                          </p:stCondLst>
+                                        </p:cTn>
+                                        <p:tgtEl>
+                                          <p:spTgt spid="13"/>
+                                        </p:tgtEl>
+                                        <p:attrNameLst>
+                                          <p:attrName>style.visibility</p:attrName>
+                                        </p:attrNameLst>
+                                      </p:cBhvr>
+                                      <p:to>
+                                        <p:strVal val="visible"/>
+                                      </p:to>
+                                    </p:set>
+                                  </p:childTnLst>
+                                </p:cTn>
+                              </p:par>
+                            </p:childTnLst>
+                          </p:cTn>
+                        </p:par>
+                      </p:childTnLst>
+                    </p:cTn>
+                  </p:par>
+                  <p:par>
+                    <p:cTn id="55" fill="hold">
+                      <p:stCondLst>
+                        <p:cond delay="indefinite"/>
+                      </p:stCondLst>
+                      <p:childTnLst>
+                        <p:par>
+                          <p:cTn id="56" fill="hold">
+                            <p:stCondLst>
+                              <p:cond delay="0"/>
+                            </p:stCondLst>
+                            <p:childTnLst>
+                              <p:par>
+                                <p:cTn id="57" presetID="1" presetClass="exit" presetSubtype="0" fill="hold" nodeType="clickEffect">
+                                  <p:stCondLst>
+                                    <p:cond delay="0"/>
+                                  </p:stCondLst>
+                                  <p:childTnLst>
+                                    <p:set>
+                                      <p:cBhvr>
+                                        <p:cTn id="58" dur="1" fill="hold">
+                                          <p:stCondLst>
+                                            <p:cond delay="0"/>
+                                          </p:stCondLst>
+                                        </p:cTn>
+                                        <p:tgtEl>
+                                          <p:spTgt spid="13"/>
+                                        </p:tgtEl>
+                                        <p:attrNameLst>
+                                          <p:attrName>style.visibility</p:attrName>
+                                        </p:attrNameLst>
+                                      </p:cBhvr>
+                                      <p:to>
+                                        <p:strVal val="hidden"/>
+                                      </p:to>
+                                    </p:set>
+                                  </p:childTnLst>
+                                </p:cTn>
+                              </p:par>
+                            </p:childTnLst>
+                          </p:cTn>
+                        </p:par>
+                      </p:childTnLst>
+                    </p:cTn>
+                  </p:par>
+                  <p:par>
+                    <p:cTn id="59" fill="hold">
+                      <p:stCondLst>
+                        <p:cond delay="indefinite"/>
+                      </p:stCondLst>
+                      <p:childTnLst>
+                        <p:par>
+                          <p:cTn id="60" fill="hold">
+                            <p:stCondLst>
+                              <p:cond delay="0"/>
+                            </p:stCondLst>
+                            <p:childTnLst>
+                              <p:par>
+                                <p:cTn id="61" presetID="1" presetClass="entr" presetSubtype="0" fill="hold" nodeType="clickEffect">
+                                  <p:stCondLst>
+                                    <p:cond delay="0"/>
+                                  </p:stCondLst>
+                                  <p:childTnLst>
+                                    <p:set>
+                                      <p:cBhvr>
+                                        <p:cTn id="62" dur="1" fill="hold">
+                                          <p:stCondLst>
+                                            <p:cond delay="0"/>
+                                          </p:stCondLst>
+                                        </p:cTn>
+                                        <p:tgtEl>
+                                          <p:spTgt spid="14"/>
+                                        </p:tgtEl>
+                                        <p:attrNameLst>
+                                          <p:attrName>style.visibility</p:attrName>
+                                        </p:attrNameLst>
+                                      </p:cBhvr>
+                                      <p:to>
+                                        <p:strVal val="visible"/>
+                                      </p:to>
+                                    </p:set>
+                                  </p:childTnLst>
+                                </p:cTn>
+                              </p:par>
+                            </p:childTnLst>
+                          </p:cTn>
+                        </p:par>
+                      </p:childTnLst>
+                    </p:cTn>
+                  </p:par>
+                  <p:par>
+                    <p:cTn id="63" fill="hold">
+                      <p:stCondLst>
+                        <p:cond delay="indefinite"/>
+                      </p:stCondLst>
+                      <p:childTnLst>
+                        <p:par>
+                          <p:cTn id="64" fill="hold">
+                            <p:stCondLst>
+                              <p:cond delay="0"/>
+                            </p:stCondLst>
+                            <p:childTnLst>
+                              <p:par>
+                                <p:cTn id="65" presetID="1" presetClass="exit" presetSubtype="0" fill="hold" nodeType="clickEffect">
+                                  <p:stCondLst>
+                                    <p:cond delay="0"/>
+                                  </p:stCondLst>
+                                  <p:childTnLst>
+                                    <p:set>
+                                      <p:cBhvr>
+                                        <p:cTn id="66" dur="1" fill="hold">
+                                          <p:stCondLst>
+                                            <p:cond delay="0"/>
+                                          </p:stCondLst>
+                                        </p:cTn>
+                                        <p:tgtEl>
+                                          <p:spTgt spid="14"/>
+                                        </p:tgtEl>
+                                        <p:attrNameLst>
+                                          <p:attrName>style.visibility</p:attrName>
+                                        </p:attrNameLst>
+                                      </p:cBhvr>
+                                      <p:to>
+                                        <p:strVal val="hidden"/>
+                                      </p:to>
+                                    </p:set>
+                                  </p:childTnLst>
+                                </p:cTn>
+                              </p:par>
+                            </p:childTnLst>
+                          </p:cTn>
+                        </p:par>
+                      </p:childTnLst>
+                    </p:cTn>
+                  </p:par>
+                  <p:par>
+                    <p:cTn id="67" fill="hold">
+                      <p:stCondLst>
+                        <p:cond delay="indefinite"/>
+                      </p:stCondLst>
+                      <p:childTnLst>
+                        <p:par>
+                          <p:cTn id="68" fill="hold">
+                            <p:stCondLst>
+                              <p:cond delay="0"/>
+                            </p:stCondLst>
+                            <p:childTnLst>
+                              <p:par>
+                                <p:cTn id="69" presetID="1" presetClass="entr" presetSubtype="0" fill="hold" nodeType="clickEffect">
+                                  <p:stCondLst>
+                                    <p:cond delay="0"/>
+                                  </p:stCondLst>
+                                  <p:childTnLst>
+                                    <p:set>
+                                      <p:cBhvr>
+                                        <p:cTn id="70" dur="1" fill="hold">
+                                          <p:stCondLst>
+                                            <p:cond delay="0"/>
+                                          </p:stCondLst>
+                                        </p:cTn>
+                                        <p:tgtEl>
+                                          <p:spTgt spid="16"/>
+                                        </p:tgtEl>
+                                        <p:attrNameLst>
+                                          <p:attrName>style.visibility</p:attrName>
+                                        </p:attrNameLst>
+                                      </p:cBhvr>
+                                      <p:to>
+                                        <p:strVal val="visible"/>
+                                      </p:to>
+                                    </p:set>
+                                  </p:childTnLst>
+                                </p:cTn>
+                              </p:par>
+                            </p:childTnLst>
+                          </p:cTn>
+                        </p:par>
+                      </p:childTnLst>
+                    </p:cTn>
+                  </p:par>
+                  <p:par>
+                    <p:cTn id="71" fill="hold">
+                      <p:stCondLst>
+                        <p:cond delay="indefinite"/>
+                      </p:stCondLst>
+                      <p:childTnLst>
+                        <p:par>
+                          <p:cTn id="72" fill="hold">
+                            <p:stCondLst>
+                              <p:cond delay="0"/>
+                            </p:stCondLst>
+                            <p:childTnLst>
+                              <p:par>
+                                <p:cTn id="73" presetID="1" presetClass="entr" presetSubtype="0" fill="hold" nodeType="clickEffect">
+                                  <p:stCondLst>
+                                    <p:cond delay="0"/>
+                                  </p:stCondLst>
+                                  <p:childTnLst>
+                                    <p:set>
+                                      <p:cBhvr>
+                                        <p:cTn id="74" dur="1" fill="hold">
+                                          <p:stCondLst>
+                                            <p:cond delay="0"/>
+                                          </p:stCondLst>
+                                        </p:cTn>
+                                        <p:tgtEl>
+                                          <p:spTgt spid="17"/>
+                                        </p:tgtEl>
+                                        <p:attrNameLst>
+                                          <p:attrName>style.visibility</p:attrName>
+                                        </p:attrNameLst>
+                                      </p:cBhvr>
+                                      <p:to>
+                                        <p:strVal val="visible"/>
+                                      </p:to>
+                                    </p:set>
+                                  </p:childTnLst>
+                                </p:cTn>
+                              </p:par>
+                            </p:childTnLst>
+                          </p:cTn>
+                        </p:par>
+                      </p:childTnLst>
+                    </p:cTn>
+                  </p:par>
+                  <p:par>
+                    <p:cTn id="75" fill="hold">
+                      <p:stCondLst>
+                        <p:cond delay="indefinite"/>
+                      </p:stCondLst>
+                      <p:childTnLst>
+                        <p:par>
+                          <p:cTn id="76" fill="hold">
+                            <p:stCondLst>
+                              <p:cond delay="0"/>
+                            </p:stCondLst>
+                            <p:childTnLst>
+                              <p:par>
+                                <p:cTn id="77" presetID="1" presetClass="exit" presetSubtype="0" fill="hold" nodeType="clickEffect">
+                                  <p:stCondLst>
+                                    <p:cond delay="0"/>
+                                  </p:stCondLst>
+                                  <p:childTnLst>
+                                    <p:set>
+                                      <p:cBhvr>
+                                        <p:cTn id="78" dur="1" fill="hold">
+                                          <p:stCondLst>
+                                            <p:cond delay="0"/>
+                                          </p:stCondLst>
+                                        </p:cTn>
+                                        <p:tgtEl>
+                                          <p:spTgt spid="16"/>
+                                        </p:tgtEl>
+                                        <p:attrNameLst>
+                                          <p:attrName>style.visibility</p:attrName>
+                                        </p:attrNameLst>
+                                      </p:cBhvr>
+                                      <p:to>
+                                        <p:strVal val="hidden"/>
+                                      </p:to>
+                                    </p:set>
+                                  </p:childTnLst>
+                                </p:cTn>
+                              </p:par>
+                              <p:par>
+                                <p:cTn id="79" presetID="1" presetClass="exit" presetSubtype="0" fill="hold" nodeType="withEffect">
+                                  <p:stCondLst>
+                                    <p:cond delay="0"/>
+                                  </p:stCondLst>
+                                  <p:childTnLst>
+                                    <p:set>
+                                      <p:cBhvr>
+                                        <p:cTn id="80" dur="1" fill="hold">
+                                          <p:stCondLst>
+                                            <p:cond delay="0"/>
+                                          </p:stCondLst>
+                                        </p:cTn>
+                                        <p:tgtEl>
+                                          <p:spTgt spid="17"/>
+                                        </p:tgtEl>
+                                        <p:attrNameLst>
+                                          <p:attrName>style.visibility</p:attrName>
+                                        </p:attrNameLst>
+                                      </p:cBhvr>
+                                      <p:to>
+                                        <p:strVal val="hidden"/>
+                                      </p:to>
+                                    </p:set>
+                                  </p:childTnLst>
+                                </p:cTn>
+                              </p:par>
+                            </p:childTnLst>
+                          </p:cTn>
+                        </p:par>
+                      </p:childTnLst>
+                    </p:cTn>
+                  </p:par>
+                  <p:par>
+                    <p:cTn id="81" fill="hold">
+                      <p:stCondLst>
+                        <p:cond delay="indefinite"/>
+                      </p:stCondLst>
+                      <p:childTnLst>
+                        <p:par>
+                          <p:cTn id="82" fill="hold">
+                            <p:stCondLst>
+                              <p:cond delay="0"/>
+                            </p:stCondLst>
+                            <p:childTnLst>
+                              <p:par>
+                                <p:cTn id="83" presetID="1" presetClass="entr" presetSubtype="0" fill="hold" nodeType="clickEffect">
+                                  <p:stCondLst>
+                                    <p:cond delay="0"/>
+                                  </p:stCondLst>
+                                  <p:childTnLst>
+                                    <p:set>
+                                      <p:cBhvr>
+                                        <p:cTn id="84" dur="1" fill="hold">
+                                          <p:stCondLst>
+                                            <p:cond delay="0"/>
+                                          </p:stCondLst>
+                                        </p:cTn>
+                                        <p:tgtEl>
+                                          <p:spTgt spid="18"/>
+                                        </p:tgtEl>
+                                        <p:attrNameLst>
+                                          <p:attrName>style.visibility</p:attrName>
+                                        </p:attrNameLst>
+                                      </p:cBhvr>
+                                      <p:to>
+                                        <p:strVal val="visible"/>
+                                      </p:to>
+                                    </p:set>
+                                  </p:childTnLst>
+                                </p:cTn>
+                              </p:par>
+                            </p:childTnLst>
+                          </p:cTn>
+                        </p:par>
+                      </p:childTnLst>
+                    </p:cTn>
+                  </p:par>
+                  <p:par>
+                    <p:cTn id="85" fill="hold">
+                      <p:stCondLst>
+                        <p:cond delay="indefinite"/>
+                      </p:stCondLst>
+                      <p:childTnLst>
+                        <p:par>
+                          <p:cTn id="86" fill="hold">
+                            <p:stCondLst>
+                              <p:cond delay="0"/>
+                            </p:stCondLst>
+                            <p:childTnLst>
+                              <p:par>
+                                <p:cTn id="87" presetID="1" presetClass="entr" presetSubtype="0" fill="hold" nodeType="clickEffect">
+                                  <p:stCondLst>
+                                    <p:cond delay="0"/>
+                                  </p:stCondLst>
+                                  <p:childTnLst>
+                                    <p:set>
+                                      <p:cBhvr>
+                                        <p:cTn id="88" dur="1" fill="hold">
+                                          <p:stCondLst>
+                                            <p:cond delay="0"/>
+                                          </p:stCondLst>
+                                        </p:cTn>
+                                        <p:tgtEl>
+                                          <p:spTgt spid="19"/>
+                                        </p:tgtEl>
+                                        <p:attrNameLst>
+                                          <p:attrName>style.visibility</p:attrName>
+                                        </p:attrNameLst>
+                                      </p:cBhvr>
+                                      <p:to>
+                                        <p:strVal val="visible"/>
+                                      </p:to>
+                                    </p:set>
+                                  </p:childTnLst>
+                                </p:cTn>
+                              </p:par>
+                            </p:childTnLst>
+                          </p:cTn>
+                        </p:par>
+                      </p:childTnLst>
+                    </p:cTn>
+                  </p:par>
+                </p:childTnLst>
+              </p:cTn>
+              <p:prevCondLst>
+                <p:cond evt="onPrev" delay="0">
+                  <p:tgtEl>
+                    <p:sldTgt/>
+                  </p:tgtEl>
+                </p:cond>
+              </p:prevCondLst>
+              <p:nextCondLst>
+                <p:cond evt="onNext" delay="0">
+                  <p:tgtEl>
+                    <p:sldTgt/>
+                  </p:tgtEl>
+                </p:cond>
+              </p:nextCondLst>
+            </p:seq>
+          </p:childTnLst>
+        </p:cTn>
       </p:par>
     </p:tnLst>
+    <p:bldLst>
+      <p:bldP spid="9" grpId="0" build="allAtOnce"/>
+      <p:bldP spid="9" grpId="1" uiExpand="1" build="allAtOnce"/>
+      <p:bldP spid="20" grpId="0"/>
+      <p:bldP spid="20" grpId="1"/>
+      <p:bldP spid="21" grpId="1"/>
+      <p:bldP spid="21" grpId="2"/>
+      <p:bldP spid="22" grpId="0"/>
+      <p:bldP spid="22" grpId="1"/>
+    </p:bldLst>
   </p:timing>
 </p:sld>
 </file>
@@ -8139,6 +10696,25 @@
               <a:t>A deformation order analysis tool for vehicle structure in crashworthiness design</a:t>
             </a:r>
             <a:endParaRPr lang="en-US"/>
+          </a:p>
+        </p:txBody>
+      </p:sp>
+      <p:sp>
+        <p:nvSpPr>
+          <p:cNvPr id="7" name="Content Placeholder 6"/>
+          <p:cNvSpPr>
+            <a:spLocks noGrp="1"/>
+          </p:cNvSpPr>
+          <p:nvPr>
+            <p:ph idx="1"/>
+          </p:nvPr>
+        </p:nvSpPr>
+        <p:spPr/>
+        <p:txBody>
+          <a:bodyPr/>
+          <a:lstStyle/>
+          <a:p>
+            <a:endParaRPr lang="en-GB"/>
           </a:p>
         </p:txBody>
       </p:sp>

</xml_diff>